<commit_message>
Update the Dado app and change the folder name
</commit_message>
<xml_diff>
--- a/Aula3.pptx
+++ b/Aula3.pptx
@@ -9,6 +9,10 @@
     <p:sldId id="257" r:id="rId3"/>
     <p:sldId id="258" r:id="rId4"/>
     <p:sldId id="259" r:id="rId5"/>
+    <p:sldId id="260" r:id="rId6"/>
+    <p:sldId id="261" r:id="rId7"/>
+    <p:sldId id="262" r:id="rId8"/>
+    <p:sldId id="263" r:id="rId9"/>
   </p:sldIdLst>
   <p:sldSz cx="12192000" cy="6858000"/>
   <p:notesSz cx="6858000" cy="9144000"/>
@@ -107,6 +111,11 @@
       </a:defRPr>
     </a:lvl9pPr>
   </p:defaultTextStyle>
+  <p:extLst>
+    <p:ext uri="{EFAFB233-063F-42B5-8137-9DF3F51BA10A}">
+      <p15:sldGuideLst xmlns:p15="http://schemas.microsoft.com/office/powerpoint/2012/main"/>
+    </p:ext>
+  </p:extLst>
 </p:presentation>
 </file>
 
@@ -241,7 +250,7 @@
           <a:p>
             <a:fld id="{5D2AF3B1-D729-408C-9620-DCBBA2C8D587}" type="datetimeFigureOut">
               <a:rPr lang="pt-BR" smtClean="0"/>
-              <a:t>17/06/2021</a:t>
+              <a:t>18/06/2021</a:t>
             </a:fld>
             <a:endParaRPr lang="pt-BR"/>
           </a:p>
@@ -411,7 +420,7 @@
           <a:p>
             <a:fld id="{5D2AF3B1-D729-408C-9620-DCBBA2C8D587}" type="datetimeFigureOut">
               <a:rPr lang="pt-BR" smtClean="0"/>
-              <a:t>17/06/2021</a:t>
+              <a:t>18/06/2021</a:t>
             </a:fld>
             <a:endParaRPr lang="pt-BR"/>
           </a:p>
@@ -591,7 +600,7 @@
           <a:p>
             <a:fld id="{5D2AF3B1-D729-408C-9620-DCBBA2C8D587}" type="datetimeFigureOut">
               <a:rPr lang="pt-BR" smtClean="0"/>
-              <a:t>17/06/2021</a:t>
+              <a:t>18/06/2021</a:t>
             </a:fld>
             <a:endParaRPr lang="pt-BR"/>
           </a:p>
@@ -761,7 +770,7 @@
           <a:p>
             <a:fld id="{5D2AF3B1-D729-408C-9620-DCBBA2C8D587}" type="datetimeFigureOut">
               <a:rPr lang="pt-BR" smtClean="0"/>
-              <a:t>17/06/2021</a:t>
+              <a:t>18/06/2021</a:t>
             </a:fld>
             <a:endParaRPr lang="pt-BR"/>
           </a:p>
@@ -1007,7 +1016,7 @@
           <a:p>
             <a:fld id="{5D2AF3B1-D729-408C-9620-DCBBA2C8D587}" type="datetimeFigureOut">
               <a:rPr lang="pt-BR" smtClean="0"/>
-              <a:t>17/06/2021</a:t>
+              <a:t>18/06/2021</a:t>
             </a:fld>
             <a:endParaRPr lang="pt-BR"/>
           </a:p>
@@ -1239,7 +1248,7 @@
           <a:p>
             <a:fld id="{5D2AF3B1-D729-408C-9620-DCBBA2C8D587}" type="datetimeFigureOut">
               <a:rPr lang="pt-BR" smtClean="0"/>
-              <a:t>17/06/2021</a:t>
+              <a:t>18/06/2021</a:t>
             </a:fld>
             <a:endParaRPr lang="pt-BR"/>
           </a:p>
@@ -1606,7 +1615,7 @@
           <a:p>
             <a:fld id="{5D2AF3B1-D729-408C-9620-DCBBA2C8D587}" type="datetimeFigureOut">
               <a:rPr lang="pt-BR" smtClean="0"/>
-              <a:t>17/06/2021</a:t>
+              <a:t>18/06/2021</a:t>
             </a:fld>
             <a:endParaRPr lang="pt-BR"/>
           </a:p>
@@ -1724,7 +1733,7 @@
           <a:p>
             <a:fld id="{5D2AF3B1-D729-408C-9620-DCBBA2C8D587}" type="datetimeFigureOut">
               <a:rPr lang="pt-BR" smtClean="0"/>
-              <a:t>17/06/2021</a:t>
+              <a:t>18/06/2021</a:t>
             </a:fld>
             <a:endParaRPr lang="pt-BR"/>
           </a:p>
@@ -1819,7 +1828,7 @@
           <a:p>
             <a:fld id="{5D2AF3B1-D729-408C-9620-DCBBA2C8D587}" type="datetimeFigureOut">
               <a:rPr lang="pt-BR" smtClean="0"/>
-              <a:t>17/06/2021</a:t>
+              <a:t>18/06/2021</a:t>
             </a:fld>
             <a:endParaRPr lang="pt-BR"/>
           </a:p>
@@ -2096,7 +2105,7 @@
           <a:p>
             <a:fld id="{5D2AF3B1-D729-408C-9620-DCBBA2C8D587}" type="datetimeFigureOut">
               <a:rPr lang="pt-BR" smtClean="0"/>
-              <a:t>17/06/2021</a:t>
+              <a:t>18/06/2021</a:t>
             </a:fld>
             <a:endParaRPr lang="pt-BR"/>
           </a:p>
@@ -2349,7 +2358,7 @@
           <a:p>
             <a:fld id="{5D2AF3B1-D729-408C-9620-DCBBA2C8D587}" type="datetimeFigureOut">
               <a:rPr lang="pt-BR" smtClean="0"/>
-              <a:t>17/06/2021</a:t>
+              <a:t>18/06/2021</a:t>
             </a:fld>
             <a:endParaRPr lang="pt-BR"/>
           </a:p>
@@ -2562,7 +2571,7 @@
           <a:p>
             <a:fld id="{5D2AF3B1-D729-408C-9620-DCBBA2C8D587}" type="datetimeFigureOut">
               <a:rPr lang="pt-BR" smtClean="0"/>
-              <a:t>17/06/2021</a:t>
+              <a:t>18/06/2021</a:t>
             </a:fld>
             <a:endParaRPr lang="pt-BR"/>
           </a:p>
@@ -4377,6 +4386,511 @@
           </a:p>
         </p:txBody>
       </p:sp>
+      <p:sp>
+        <p:nvSpPr>
+          <p:cNvPr id="2" name="CaixaDeTexto 1"/>
+          <p:cNvSpPr txBox="1"/>
+          <p:nvPr/>
+        </p:nvSpPr>
+        <p:spPr>
+          <a:xfrm>
+            <a:off x="97536" y="2560325"/>
+            <a:ext cx="4508478" cy="369332"/>
+          </a:xfrm>
+          <a:prstGeom prst="rect">
+            <a:avLst/>
+          </a:prstGeom>
+          <a:noFill/>
+        </p:spPr>
+        <p:txBody>
+          <a:bodyPr wrap="none" rtlCol="0">
+            <a:spAutoFit/>
+          </a:bodyPr>
+          <a:lstStyle/>
+          <a:p>
+            <a:r>
+              <a:rPr lang="pt-BR" dirty="0" smtClean="0"/>
+              <a:t>Adicionar uma nova </a:t>
+            </a:r>
+            <a:r>
+              <a:rPr lang="pt-BR" dirty="0" err="1" smtClean="0"/>
+              <a:t>activity</a:t>
+            </a:r>
+            <a:r>
+              <a:rPr lang="pt-BR" dirty="0" smtClean="0"/>
+              <a:t> modo automático</a:t>
+            </a:r>
+            <a:endParaRPr lang="pt-BR" dirty="0"/>
+          </a:p>
+        </p:txBody>
+      </p:sp>
+      <p:pic>
+        <p:nvPicPr>
+          <p:cNvPr id="3" name="Imagem 2"/>
+          <p:cNvPicPr>
+            <a:picLocks noChangeAspect="1"/>
+          </p:cNvPicPr>
+          <p:nvPr/>
+        </p:nvPicPr>
+        <p:blipFill rotWithShape="1">
+          <a:blip r:embed="rId4"/>
+          <a:srcRect l="50161" t="2702" r="16694" b="56242"/>
+          <a:stretch/>
+        </p:blipFill>
+        <p:spPr>
+          <a:xfrm>
+            <a:off x="136705" y="2981732"/>
+            <a:ext cx="5185694" cy="3842532"/>
+          </a:xfrm>
+          <a:prstGeom prst="rect">
+            <a:avLst/>
+          </a:prstGeom>
+        </p:spPr>
+      </p:pic>
+      <p:sp>
+        <p:nvSpPr>
+          <p:cNvPr id="14" name="CaixaDeTexto 13"/>
+          <p:cNvSpPr txBox="1"/>
+          <p:nvPr/>
+        </p:nvSpPr>
+        <p:spPr>
+          <a:xfrm>
+            <a:off x="6237116" y="2617763"/>
+            <a:ext cx="4141262" cy="369332"/>
+          </a:xfrm>
+          <a:prstGeom prst="rect">
+            <a:avLst/>
+          </a:prstGeom>
+          <a:noFill/>
+        </p:spPr>
+        <p:txBody>
+          <a:bodyPr wrap="none" rtlCol="0">
+            <a:spAutoFit/>
+          </a:bodyPr>
+          <a:lstStyle/>
+          <a:p>
+            <a:r>
+              <a:rPr lang="pt-BR" dirty="0" smtClean="0"/>
+              <a:t>Adicionar uma nova </a:t>
+            </a:r>
+            <a:r>
+              <a:rPr lang="pt-BR" dirty="0" err="1" smtClean="0"/>
+              <a:t>activity</a:t>
+            </a:r>
+            <a:r>
+              <a:rPr lang="pt-BR" dirty="0" smtClean="0"/>
+              <a:t> modo manual</a:t>
+            </a:r>
+            <a:endParaRPr lang="pt-BR" dirty="0"/>
+          </a:p>
+        </p:txBody>
+      </p:sp>
+      <p:pic>
+        <p:nvPicPr>
+          <p:cNvPr id="5" name="Imagem 4"/>
+          <p:cNvPicPr>
+            <a:picLocks noChangeAspect="1"/>
+          </p:cNvPicPr>
+          <p:nvPr/>
+        </p:nvPicPr>
+        <p:blipFill rotWithShape="1">
+          <a:blip r:embed="rId5"/>
+          <a:srcRect l="49436" t="7926" r="16693" b="86740"/>
+          <a:stretch/>
+        </p:blipFill>
+        <p:spPr>
+          <a:xfrm>
+            <a:off x="5792833" y="3245133"/>
+            <a:ext cx="5029827" cy="571712"/>
+          </a:xfrm>
+          <a:prstGeom prst="rect">
+            <a:avLst/>
+          </a:prstGeom>
+        </p:spPr>
+      </p:pic>
+      <p:sp>
+        <p:nvSpPr>
+          <p:cNvPr id="7" name="CaixaDeTexto 6"/>
+          <p:cNvSpPr txBox="1"/>
+          <p:nvPr/>
+        </p:nvSpPr>
+        <p:spPr>
+          <a:xfrm>
+            <a:off x="5739255" y="2876692"/>
+            <a:ext cx="1712328" cy="369332"/>
+          </a:xfrm>
+          <a:prstGeom prst="rect">
+            <a:avLst/>
+          </a:prstGeom>
+          <a:noFill/>
+        </p:spPr>
+        <p:txBody>
+          <a:bodyPr wrap="none" rtlCol="0">
+            <a:spAutoFit/>
+          </a:bodyPr>
+          <a:lstStyle/>
+          <a:p>
+            <a:r>
+              <a:rPr lang="pt-BR" dirty="0" smtClean="0"/>
+              <a:t>Adicionar Classe</a:t>
+            </a:r>
+            <a:endParaRPr lang="pt-BR" dirty="0"/>
+          </a:p>
+        </p:txBody>
+      </p:sp>
+      <p:sp>
+        <p:nvSpPr>
+          <p:cNvPr id="15" name="CaixaDeTexto 14"/>
+          <p:cNvSpPr txBox="1"/>
+          <p:nvPr/>
+        </p:nvSpPr>
+        <p:spPr>
+          <a:xfrm>
+            <a:off x="5739255" y="3965232"/>
+            <a:ext cx="1756635" cy="369332"/>
+          </a:xfrm>
+          <a:prstGeom prst="rect">
+            <a:avLst/>
+          </a:prstGeom>
+          <a:noFill/>
+        </p:spPr>
+        <p:txBody>
+          <a:bodyPr wrap="none" rtlCol="0">
+            <a:spAutoFit/>
+          </a:bodyPr>
+          <a:lstStyle/>
+          <a:p>
+            <a:r>
+              <a:rPr lang="pt-BR" dirty="0" smtClean="0"/>
+              <a:t>Adicionar Layout</a:t>
+            </a:r>
+            <a:endParaRPr lang="pt-BR" dirty="0"/>
+          </a:p>
+        </p:txBody>
+      </p:sp>
+      <p:pic>
+        <p:nvPicPr>
+          <p:cNvPr id="16" name="Imagem 15"/>
+          <p:cNvPicPr>
+            <a:picLocks noChangeAspect="1"/>
+          </p:cNvPicPr>
+          <p:nvPr/>
+        </p:nvPicPr>
+        <p:blipFill rotWithShape="1">
+          <a:blip r:embed="rId6"/>
+          <a:srcRect l="50161" t="17951" r="21290" b="77189"/>
+          <a:stretch/>
+        </p:blipFill>
+        <p:spPr>
+          <a:xfrm>
+            <a:off x="5792833" y="4334564"/>
+            <a:ext cx="5029827" cy="607934"/>
+          </a:xfrm>
+          <a:prstGeom prst="rect">
+            <a:avLst/>
+          </a:prstGeom>
+        </p:spPr>
+      </p:pic>
+      <p:pic>
+        <p:nvPicPr>
+          <p:cNvPr id="17" name="Imagem 16"/>
+          <p:cNvPicPr>
+            <a:picLocks noChangeAspect="1"/>
+          </p:cNvPicPr>
+          <p:nvPr/>
+        </p:nvPicPr>
+        <p:blipFill>
+          <a:blip r:embed="rId7"/>
+          <a:stretch>
+            <a:fillRect/>
+          </a:stretch>
+        </p:blipFill>
+        <p:spPr>
+          <a:xfrm>
+            <a:off x="5792833" y="5460217"/>
+            <a:ext cx="2000250" cy="600075"/>
+          </a:xfrm>
+          <a:prstGeom prst="rect">
+            <a:avLst/>
+          </a:prstGeom>
+        </p:spPr>
+      </p:pic>
+      <p:sp>
+        <p:nvSpPr>
+          <p:cNvPr id="18" name="CaixaDeTexto 17"/>
+          <p:cNvSpPr txBox="1"/>
+          <p:nvPr/>
+        </p:nvSpPr>
+        <p:spPr>
+          <a:xfrm>
+            <a:off x="5739255" y="5018901"/>
+            <a:ext cx="4589974" cy="369332"/>
+          </a:xfrm>
+          <a:prstGeom prst="rect">
+            <a:avLst/>
+          </a:prstGeom>
+          <a:noFill/>
+        </p:spPr>
+        <p:txBody>
+          <a:bodyPr wrap="none" rtlCol="0">
+            <a:spAutoFit/>
+          </a:bodyPr>
+          <a:lstStyle/>
+          <a:p>
+            <a:r>
+              <a:rPr lang="pt-BR" dirty="0" smtClean="0"/>
+              <a:t>Adicionar </a:t>
+            </a:r>
+            <a:r>
+              <a:rPr lang="pt-BR" dirty="0" err="1" smtClean="0"/>
+              <a:t>Adicionar</a:t>
+            </a:r>
+            <a:r>
+              <a:rPr lang="pt-BR" dirty="0" smtClean="0"/>
+              <a:t> </a:t>
+            </a:r>
+            <a:r>
+              <a:rPr lang="pt-BR" dirty="0" err="1" smtClean="0"/>
+              <a:t>activity</a:t>
+            </a:r>
+            <a:r>
+              <a:rPr lang="pt-BR" dirty="0" smtClean="0"/>
+              <a:t> dentro da </a:t>
+            </a:r>
+            <a:r>
+              <a:rPr lang="pt-BR" dirty="0" err="1" smtClean="0"/>
+              <a:t>manifest</a:t>
+            </a:r>
+            <a:endParaRPr lang="pt-BR" dirty="0"/>
+          </a:p>
+        </p:txBody>
+      </p:sp>
+      <p:sp>
+        <p:nvSpPr>
+          <p:cNvPr id="19" name="Rectangle 1"/>
+          <p:cNvSpPr>
+            <a:spLocks noChangeArrowheads="1"/>
+          </p:cNvSpPr>
+          <p:nvPr/>
+        </p:nvSpPr>
+        <p:spPr bwMode="auto">
+          <a:xfrm>
+            <a:off x="8136734" y="5637143"/>
+            <a:ext cx="3375412" cy="246221"/>
+          </a:xfrm>
+          <a:prstGeom prst="rect">
+            <a:avLst/>
+          </a:prstGeom>
+          <a:solidFill>
+            <a:srgbClr val="2B2B2B"/>
+          </a:solidFill>
+          <a:ln>
+            <a:noFill/>
+          </a:ln>
+          <a:effectLst/>
+          <a:extLst>
+            <a:ext uri="{91240B29-F687-4F45-9708-019B960494DF}">
+              <a14:hiddenLine xmlns:a14="http://schemas.microsoft.com/office/drawing/2010/main" w="9525">
+                <a:solidFill>
+                  <a:schemeClr val="tx1"/>
+                </a:solidFill>
+                <a:miter lim="800000"/>
+                <a:headEnd/>
+                <a:tailEnd/>
+              </a14:hiddenLine>
+            </a:ext>
+            <a:ext uri="{AF507438-7753-43E0-B8FC-AC1667EBCBE1}">
+              <a14:hiddenEffects xmlns:a14="http://schemas.microsoft.com/office/drawing/2010/main">
+                <a:effectLst>
+                  <a:outerShdw dist="35921" dir="2700000" algn="ctr" rotWithShape="0">
+                    <a:schemeClr val="bg2"/>
+                  </a:outerShdw>
+                </a:effectLst>
+              </a14:hiddenEffects>
+            </a:ext>
+          </a:extLst>
+        </p:spPr>
+        <p:txBody>
+          <a:bodyPr vert="horz" wrap="square" lIns="91440" tIns="45720" rIns="91440" bIns="45720" numCol="1" anchor="ctr" anchorCtr="0" compatLnSpc="1">
+            <a:prstTxWarp prst="textNoShape">
+              <a:avLst/>
+            </a:prstTxWarp>
+            <a:spAutoFit/>
+          </a:bodyPr>
+          <a:lstStyle/>
+          <a:p>
+            <a:pPr marL="0" marR="0" lvl="0" indent="0" algn="l" defTabSz="914400" rtl="0" eaLnBrk="0" fontAlgn="base" latinLnBrk="0" hangingPunct="0">
+              <a:lnSpc>
+                <a:spcPct val="100000"/>
+              </a:lnSpc>
+              <a:spcBef>
+                <a:spcPct val="0"/>
+              </a:spcBef>
+              <a:spcAft>
+                <a:spcPct val="0"/>
+              </a:spcAft>
+              <a:buClrTx/>
+              <a:buSzTx/>
+              <a:buFontTx/>
+              <a:buNone/>
+              <a:tabLst/>
+            </a:pPr>
+            <a:r>
+              <a:rPr kumimoji="0" lang="pt-BR" altLang="pt-BR" sz="1000" b="0" i="0" u="none" strike="noStrike" cap="none" normalizeH="0" baseline="0" dirty="0" smtClean="0">
+                <a:ln>
+                  <a:noFill/>
+                </a:ln>
+                <a:solidFill>
+                  <a:srgbClr val="E8BF6A"/>
+                </a:solidFill>
+                <a:effectLst/>
+                <a:latin typeface="JetBrains Mono"/>
+              </a:rPr>
+              <a:t>&lt;</a:t>
+            </a:r>
+            <a:r>
+              <a:rPr kumimoji="0" lang="pt-BR" altLang="pt-BR" sz="1000" b="0" i="0" u="none" strike="noStrike" cap="none" normalizeH="0" baseline="0" dirty="0" err="1" smtClean="0">
+                <a:ln>
+                  <a:noFill/>
+                </a:ln>
+                <a:solidFill>
+                  <a:srgbClr val="E8BF6A"/>
+                </a:solidFill>
+                <a:effectLst/>
+                <a:latin typeface="JetBrains Mono"/>
+              </a:rPr>
+              <a:t>activity</a:t>
+            </a:r>
+            <a:r>
+              <a:rPr kumimoji="0" lang="pt-BR" altLang="pt-BR" sz="1000" b="0" i="0" u="none" strike="noStrike" cap="none" normalizeH="0" baseline="0" dirty="0" smtClean="0">
+                <a:ln>
+                  <a:noFill/>
+                </a:ln>
+                <a:solidFill>
+                  <a:srgbClr val="E8BF6A"/>
+                </a:solidFill>
+                <a:effectLst/>
+                <a:latin typeface="JetBrains Mono"/>
+              </a:rPr>
+              <a:t> </a:t>
+            </a:r>
+            <a:r>
+              <a:rPr kumimoji="0" lang="pt-BR" altLang="pt-BR" sz="1000" b="0" i="0" u="none" strike="noStrike" cap="none" normalizeH="0" baseline="0" dirty="0" err="1" smtClean="0">
+                <a:ln>
+                  <a:noFill/>
+                </a:ln>
+                <a:solidFill>
+                  <a:srgbClr val="9876AA"/>
+                </a:solidFill>
+                <a:effectLst/>
+                <a:latin typeface="JetBrains Mono"/>
+              </a:rPr>
+              <a:t>android</a:t>
+            </a:r>
+            <a:r>
+              <a:rPr kumimoji="0" lang="pt-BR" altLang="pt-BR" sz="1000" b="0" i="0" u="none" strike="noStrike" cap="none" normalizeH="0" baseline="0" dirty="0" err="1" smtClean="0">
+                <a:ln>
+                  <a:noFill/>
+                </a:ln>
+                <a:solidFill>
+                  <a:srgbClr val="BABABA"/>
+                </a:solidFill>
+                <a:effectLst/>
+                <a:latin typeface="JetBrains Mono"/>
+              </a:rPr>
+              <a:t>:name</a:t>
+            </a:r>
+            <a:r>
+              <a:rPr kumimoji="0" lang="pt-BR" altLang="pt-BR" sz="1000" b="0" i="0" u="none" strike="noStrike" cap="none" normalizeH="0" baseline="0" dirty="0" smtClean="0">
+                <a:ln>
+                  <a:noFill/>
+                </a:ln>
+                <a:solidFill>
+                  <a:srgbClr val="6A8759"/>
+                </a:solidFill>
+                <a:effectLst/>
+                <a:latin typeface="JetBrains Mono"/>
+              </a:rPr>
+              <a:t>=".</a:t>
+            </a:r>
+            <a:r>
+              <a:rPr kumimoji="0" lang="pt-BR" altLang="pt-BR" sz="1000" b="0" i="0" u="none" strike="noStrike" cap="none" normalizeH="0" baseline="0" dirty="0" err="1" smtClean="0">
+                <a:ln>
+                  <a:noFill/>
+                </a:ln>
+                <a:solidFill>
+                  <a:srgbClr val="6A8759"/>
+                </a:solidFill>
+                <a:effectLst/>
+                <a:latin typeface="JetBrains Mono"/>
+              </a:rPr>
+              <a:t>RegisterUser</a:t>
+            </a:r>
+            <a:r>
+              <a:rPr kumimoji="0" lang="pt-BR" altLang="pt-BR" sz="1000" b="0" i="0" u="none" strike="noStrike" cap="none" normalizeH="0" baseline="0" dirty="0" smtClean="0">
+                <a:ln>
+                  <a:noFill/>
+                </a:ln>
+                <a:solidFill>
+                  <a:srgbClr val="6A8759"/>
+                </a:solidFill>
+                <a:effectLst/>
+                <a:latin typeface="JetBrains Mono"/>
+              </a:rPr>
+              <a:t>"</a:t>
+            </a:r>
+            <a:r>
+              <a:rPr kumimoji="0" lang="pt-BR" altLang="pt-BR" sz="1000" b="0" i="0" u="none" strike="noStrike" cap="none" normalizeH="0" baseline="0" dirty="0" smtClean="0">
+                <a:ln>
+                  <a:noFill/>
+                </a:ln>
+                <a:solidFill>
+                  <a:srgbClr val="E8BF6A"/>
+                </a:solidFill>
+                <a:effectLst/>
+                <a:latin typeface="JetBrains Mono"/>
+              </a:rPr>
+              <a:t>&gt;&lt;/</a:t>
+            </a:r>
+            <a:r>
+              <a:rPr kumimoji="0" lang="pt-BR" altLang="pt-BR" sz="1000" b="0" i="0" u="none" strike="noStrike" cap="none" normalizeH="0" baseline="0" dirty="0" err="1" smtClean="0">
+                <a:ln>
+                  <a:noFill/>
+                </a:ln>
+                <a:solidFill>
+                  <a:srgbClr val="E8BF6A"/>
+                </a:solidFill>
+                <a:effectLst/>
+                <a:latin typeface="JetBrains Mono"/>
+              </a:rPr>
+              <a:t>activity</a:t>
+            </a:r>
+            <a:r>
+              <a:rPr kumimoji="0" lang="pt-BR" altLang="pt-BR" sz="1000" b="0" i="0" u="none" strike="noStrike" cap="none" normalizeH="0" baseline="0" dirty="0" smtClean="0">
+                <a:ln>
+                  <a:noFill/>
+                </a:ln>
+                <a:solidFill>
+                  <a:srgbClr val="E8BF6A"/>
+                </a:solidFill>
+                <a:effectLst/>
+                <a:latin typeface="JetBrains Mono"/>
+              </a:rPr>
+              <a:t>&gt;</a:t>
+            </a:r>
+            <a:endParaRPr kumimoji="0" lang="pt-BR" altLang="pt-BR" sz="1800" b="0" i="0" u="none" strike="noStrike" cap="none" normalizeH="0" baseline="0" dirty="0" smtClean="0">
+              <a:ln>
+                <a:noFill/>
+              </a:ln>
+              <a:solidFill>
+                <a:schemeClr val="tx1"/>
+              </a:solidFill>
+              <a:effectLst/>
+              <a:latin typeface="Arial" panose="020B0604020202020204" pitchFamily="34" charset="0"/>
+            </a:endParaRPr>
+          </a:p>
+        </p:txBody>
+      </p:sp>
     </p:spTree>
     <p:extLst>
       <p:ext uri="{BB962C8B-B14F-4D97-AF65-F5344CB8AC3E}">
@@ -4407,10 +4921,2825 @@
           <a:chExt cx="0" cy="0"/>
         </a:xfrm>
       </p:grpSpPr>
+      <p:sp>
+        <p:nvSpPr>
+          <p:cNvPr id="2" name="Rectangle 1"/>
+          <p:cNvSpPr>
+            <a:spLocks noChangeArrowheads="1"/>
+          </p:cNvSpPr>
+          <p:nvPr/>
+        </p:nvSpPr>
+        <p:spPr bwMode="auto">
+          <a:xfrm>
+            <a:off x="0" y="252680"/>
+            <a:ext cx="5542156" cy="1323439"/>
+          </a:xfrm>
+          <a:prstGeom prst="rect">
+            <a:avLst/>
+          </a:prstGeom>
+          <a:solidFill>
+            <a:srgbClr val="2B2B2B"/>
+          </a:solidFill>
+          <a:ln>
+            <a:noFill/>
+          </a:ln>
+          <a:effectLst/>
+          <a:extLst>
+            <a:ext uri="{91240B29-F687-4F45-9708-019B960494DF}">
+              <a14:hiddenLine xmlns:a14="http://schemas.microsoft.com/office/drawing/2010/main" w="9525">
+                <a:solidFill>
+                  <a:schemeClr val="tx1"/>
+                </a:solidFill>
+                <a:miter lim="800000"/>
+                <a:headEnd/>
+                <a:tailEnd/>
+              </a14:hiddenLine>
+            </a:ext>
+            <a:ext uri="{AF507438-7753-43E0-B8FC-AC1667EBCBE1}">
+              <a14:hiddenEffects xmlns:a14="http://schemas.microsoft.com/office/drawing/2010/main">
+                <a:effectLst>
+                  <a:outerShdw dist="35921" dir="2700000" algn="ctr" rotWithShape="0">
+                    <a:schemeClr val="bg2"/>
+                  </a:outerShdw>
+                </a:effectLst>
+              </a14:hiddenEffects>
+            </a:ext>
+          </a:extLst>
+        </p:spPr>
+        <p:txBody>
+          <a:bodyPr vert="horz" wrap="square" lIns="91440" tIns="45720" rIns="91440" bIns="45720" numCol="1" anchor="ctr" anchorCtr="0" compatLnSpc="1">
+            <a:prstTxWarp prst="textNoShape">
+              <a:avLst/>
+            </a:prstTxWarp>
+            <a:spAutoFit/>
+          </a:bodyPr>
+          <a:lstStyle/>
+          <a:p>
+            <a:pPr marL="0" marR="0" lvl="0" indent="0" algn="l" defTabSz="914400" rtl="0" eaLnBrk="0" fontAlgn="base" latinLnBrk="0" hangingPunct="0">
+              <a:lnSpc>
+                <a:spcPct val="100000"/>
+              </a:lnSpc>
+              <a:spcBef>
+                <a:spcPct val="0"/>
+              </a:spcBef>
+              <a:spcAft>
+                <a:spcPct val="0"/>
+              </a:spcAft>
+              <a:buClrTx/>
+              <a:buSzTx/>
+              <a:buFontTx/>
+              <a:buNone/>
+              <a:tabLst/>
+            </a:pPr>
+            <a:r>
+              <a:rPr kumimoji="0" lang="pt-BR" altLang="pt-BR" sz="1000" b="0" i="0" u="none" strike="noStrike" cap="none" normalizeH="0" baseline="0" smtClean="0">
+                <a:ln>
+                  <a:noFill/>
+                </a:ln>
+                <a:solidFill>
+                  <a:srgbClr val="E8BF6A"/>
+                </a:solidFill>
+                <a:effectLst/>
+                <a:latin typeface="JetBrains Mono"/>
+              </a:rPr>
+              <a:t>&lt;activity </a:t>
+            </a:r>
+            <a:r>
+              <a:rPr kumimoji="0" lang="pt-BR" altLang="pt-BR" sz="1000" b="0" i="0" u="none" strike="noStrike" cap="none" normalizeH="0" baseline="0" smtClean="0">
+                <a:ln>
+                  <a:noFill/>
+                </a:ln>
+                <a:solidFill>
+                  <a:srgbClr val="9876AA"/>
+                </a:solidFill>
+                <a:effectLst/>
+                <a:latin typeface="JetBrains Mono"/>
+              </a:rPr>
+              <a:t>android</a:t>
+            </a:r>
+            <a:r>
+              <a:rPr kumimoji="0" lang="pt-BR" altLang="pt-BR" sz="1000" b="0" i="0" u="none" strike="noStrike" cap="none" normalizeH="0" baseline="0" smtClean="0">
+                <a:ln>
+                  <a:noFill/>
+                </a:ln>
+                <a:solidFill>
+                  <a:srgbClr val="BABABA"/>
+                </a:solidFill>
+                <a:effectLst/>
+                <a:latin typeface="JetBrains Mono"/>
+              </a:rPr>
+              <a:t>:name</a:t>
+            </a:r>
+            <a:r>
+              <a:rPr kumimoji="0" lang="pt-BR" altLang="pt-BR" sz="1000" b="0" i="0" u="none" strike="noStrike" cap="none" normalizeH="0" baseline="0" smtClean="0">
+                <a:ln>
+                  <a:noFill/>
+                </a:ln>
+                <a:solidFill>
+                  <a:srgbClr val="6A8759"/>
+                </a:solidFill>
+                <a:effectLst/>
+                <a:latin typeface="JetBrains Mono"/>
+              </a:rPr>
+              <a:t>=".RegisterUser"</a:t>
+            </a:r>
+            <a:r>
+              <a:rPr kumimoji="0" lang="pt-BR" altLang="pt-BR" sz="1000" b="0" i="0" u="none" strike="noStrike" cap="none" normalizeH="0" baseline="0" smtClean="0">
+                <a:ln>
+                  <a:noFill/>
+                </a:ln>
+                <a:solidFill>
+                  <a:srgbClr val="E8BF6A"/>
+                </a:solidFill>
+                <a:effectLst/>
+                <a:latin typeface="JetBrains Mono"/>
+              </a:rPr>
+              <a:t>&gt;</a:t>
+            </a:r>
+            <a:br>
+              <a:rPr kumimoji="0" lang="pt-BR" altLang="pt-BR" sz="1000" b="0" i="0" u="none" strike="noStrike" cap="none" normalizeH="0" baseline="0" smtClean="0">
+                <a:ln>
+                  <a:noFill/>
+                </a:ln>
+                <a:solidFill>
+                  <a:srgbClr val="E8BF6A"/>
+                </a:solidFill>
+                <a:effectLst/>
+                <a:latin typeface="JetBrains Mono"/>
+              </a:rPr>
+            </a:br>
+            <a:r>
+              <a:rPr kumimoji="0" lang="pt-BR" altLang="pt-BR" sz="1000" b="0" i="0" u="none" strike="noStrike" cap="none" normalizeH="0" baseline="0" smtClean="0">
+                <a:ln>
+                  <a:noFill/>
+                </a:ln>
+                <a:solidFill>
+                  <a:srgbClr val="E8BF6A"/>
+                </a:solidFill>
+                <a:effectLst/>
+                <a:latin typeface="JetBrains Mono"/>
+              </a:rPr>
+              <a:t>    &lt;intent-filter&gt;</a:t>
+            </a:r>
+            <a:br>
+              <a:rPr kumimoji="0" lang="pt-BR" altLang="pt-BR" sz="1000" b="0" i="0" u="none" strike="noStrike" cap="none" normalizeH="0" baseline="0" smtClean="0">
+                <a:ln>
+                  <a:noFill/>
+                </a:ln>
+                <a:solidFill>
+                  <a:srgbClr val="E8BF6A"/>
+                </a:solidFill>
+                <a:effectLst/>
+                <a:latin typeface="JetBrains Mono"/>
+              </a:rPr>
+            </a:br>
+            <a:r>
+              <a:rPr kumimoji="0" lang="pt-BR" altLang="pt-BR" sz="1000" b="0" i="0" u="none" strike="noStrike" cap="none" normalizeH="0" baseline="0" smtClean="0">
+                <a:ln>
+                  <a:noFill/>
+                </a:ln>
+                <a:solidFill>
+                  <a:srgbClr val="E8BF6A"/>
+                </a:solidFill>
+                <a:effectLst/>
+                <a:latin typeface="JetBrains Mono"/>
+              </a:rPr>
+              <a:t>        &lt;action </a:t>
+            </a:r>
+            <a:r>
+              <a:rPr kumimoji="0" lang="pt-BR" altLang="pt-BR" sz="1000" b="0" i="0" u="none" strike="noStrike" cap="none" normalizeH="0" baseline="0" smtClean="0">
+                <a:ln>
+                  <a:noFill/>
+                </a:ln>
+                <a:solidFill>
+                  <a:srgbClr val="9876AA"/>
+                </a:solidFill>
+                <a:effectLst/>
+                <a:latin typeface="JetBrains Mono"/>
+              </a:rPr>
+              <a:t>android</a:t>
+            </a:r>
+            <a:r>
+              <a:rPr kumimoji="0" lang="pt-BR" altLang="pt-BR" sz="1000" b="0" i="0" u="none" strike="noStrike" cap="none" normalizeH="0" baseline="0" smtClean="0">
+                <a:ln>
+                  <a:noFill/>
+                </a:ln>
+                <a:solidFill>
+                  <a:srgbClr val="BABABA"/>
+                </a:solidFill>
+                <a:effectLst/>
+                <a:latin typeface="JetBrains Mono"/>
+              </a:rPr>
+              <a:t>:name</a:t>
+            </a:r>
+            <a:r>
+              <a:rPr kumimoji="0" lang="pt-BR" altLang="pt-BR" sz="1000" b="0" i="0" u="none" strike="noStrike" cap="none" normalizeH="0" baseline="0" smtClean="0">
+                <a:ln>
+                  <a:noFill/>
+                </a:ln>
+                <a:solidFill>
+                  <a:srgbClr val="6A8759"/>
+                </a:solidFill>
+                <a:effectLst/>
+                <a:latin typeface="JetBrains Mono"/>
+              </a:rPr>
+              <a:t>="android.intent.action.MAIN" </a:t>
+            </a:r>
+            <a:r>
+              <a:rPr kumimoji="0" lang="pt-BR" altLang="pt-BR" sz="1000" b="0" i="0" u="none" strike="noStrike" cap="none" normalizeH="0" baseline="0" smtClean="0">
+                <a:ln>
+                  <a:noFill/>
+                </a:ln>
+                <a:solidFill>
+                  <a:srgbClr val="E8BF6A"/>
+                </a:solidFill>
+                <a:effectLst/>
+                <a:latin typeface="JetBrains Mono"/>
+              </a:rPr>
+              <a:t>/&gt;</a:t>
+            </a:r>
+            <a:br>
+              <a:rPr kumimoji="0" lang="pt-BR" altLang="pt-BR" sz="1000" b="0" i="0" u="none" strike="noStrike" cap="none" normalizeH="0" baseline="0" smtClean="0">
+                <a:ln>
+                  <a:noFill/>
+                </a:ln>
+                <a:solidFill>
+                  <a:srgbClr val="E8BF6A"/>
+                </a:solidFill>
+                <a:effectLst/>
+                <a:latin typeface="JetBrains Mono"/>
+              </a:rPr>
+            </a:br>
+            <a:r>
+              <a:rPr kumimoji="0" lang="pt-BR" altLang="pt-BR" sz="1000" b="0" i="0" u="none" strike="noStrike" cap="none" normalizeH="0" baseline="0" smtClean="0">
+                <a:ln>
+                  <a:noFill/>
+                </a:ln>
+                <a:solidFill>
+                  <a:srgbClr val="E8BF6A"/>
+                </a:solidFill>
+                <a:effectLst/>
+                <a:latin typeface="JetBrains Mono"/>
+              </a:rPr>
+              <a:t/>
+            </a:r>
+            <a:br>
+              <a:rPr kumimoji="0" lang="pt-BR" altLang="pt-BR" sz="1000" b="0" i="0" u="none" strike="noStrike" cap="none" normalizeH="0" baseline="0" smtClean="0">
+                <a:ln>
+                  <a:noFill/>
+                </a:ln>
+                <a:solidFill>
+                  <a:srgbClr val="E8BF6A"/>
+                </a:solidFill>
+                <a:effectLst/>
+                <a:latin typeface="JetBrains Mono"/>
+              </a:rPr>
+            </a:br>
+            <a:r>
+              <a:rPr kumimoji="0" lang="pt-BR" altLang="pt-BR" sz="1000" b="0" i="0" u="none" strike="noStrike" cap="none" normalizeH="0" baseline="0" smtClean="0">
+                <a:ln>
+                  <a:noFill/>
+                </a:ln>
+                <a:solidFill>
+                  <a:srgbClr val="E8BF6A"/>
+                </a:solidFill>
+                <a:effectLst/>
+                <a:latin typeface="JetBrains Mono"/>
+              </a:rPr>
+              <a:t>        &lt;category </a:t>
+            </a:r>
+            <a:r>
+              <a:rPr kumimoji="0" lang="pt-BR" altLang="pt-BR" sz="1000" b="0" i="0" u="none" strike="noStrike" cap="none" normalizeH="0" baseline="0" smtClean="0">
+                <a:ln>
+                  <a:noFill/>
+                </a:ln>
+                <a:solidFill>
+                  <a:srgbClr val="9876AA"/>
+                </a:solidFill>
+                <a:effectLst/>
+                <a:latin typeface="JetBrains Mono"/>
+              </a:rPr>
+              <a:t>android</a:t>
+            </a:r>
+            <a:r>
+              <a:rPr kumimoji="0" lang="pt-BR" altLang="pt-BR" sz="1000" b="0" i="0" u="none" strike="noStrike" cap="none" normalizeH="0" baseline="0" smtClean="0">
+                <a:ln>
+                  <a:noFill/>
+                </a:ln>
+                <a:solidFill>
+                  <a:srgbClr val="BABABA"/>
+                </a:solidFill>
+                <a:effectLst/>
+                <a:latin typeface="JetBrains Mono"/>
+              </a:rPr>
+              <a:t>:name</a:t>
+            </a:r>
+            <a:r>
+              <a:rPr kumimoji="0" lang="pt-BR" altLang="pt-BR" sz="1000" b="0" i="0" u="none" strike="noStrike" cap="none" normalizeH="0" baseline="0" smtClean="0">
+                <a:ln>
+                  <a:noFill/>
+                </a:ln>
+                <a:solidFill>
+                  <a:srgbClr val="6A8759"/>
+                </a:solidFill>
+                <a:effectLst/>
+                <a:latin typeface="JetBrains Mono"/>
+              </a:rPr>
+              <a:t>="android.intent.category.LAUNCHER" </a:t>
+            </a:r>
+            <a:r>
+              <a:rPr kumimoji="0" lang="pt-BR" altLang="pt-BR" sz="1000" b="0" i="0" u="none" strike="noStrike" cap="none" normalizeH="0" baseline="0" smtClean="0">
+                <a:ln>
+                  <a:noFill/>
+                </a:ln>
+                <a:solidFill>
+                  <a:srgbClr val="E8BF6A"/>
+                </a:solidFill>
+                <a:effectLst/>
+                <a:latin typeface="JetBrains Mono"/>
+              </a:rPr>
+              <a:t>/&gt;</a:t>
+            </a:r>
+            <a:br>
+              <a:rPr kumimoji="0" lang="pt-BR" altLang="pt-BR" sz="1000" b="0" i="0" u="none" strike="noStrike" cap="none" normalizeH="0" baseline="0" smtClean="0">
+                <a:ln>
+                  <a:noFill/>
+                </a:ln>
+                <a:solidFill>
+                  <a:srgbClr val="E8BF6A"/>
+                </a:solidFill>
+                <a:effectLst/>
+                <a:latin typeface="JetBrains Mono"/>
+              </a:rPr>
+            </a:br>
+            <a:r>
+              <a:rPr kumimoji="0" lang="pt-BR" altLang="pt-BR" sz="1000" b="0" i="0" u="none" strike="noStrike" cap="none" normalizeH="0" baseline="0" smtClean="0">
+                <a:ln>
+                  <a:noFill/>
+                </a:ln>
+                <a:solidFill>
+                  <a:srgbClr val="E8BF6A"/>
+                </a:solidFill>
+                <a:effectLst/>
+                <a:latin typeface="JetBrains Mono"/>
+              </a:rPr>
+              <a:t>    &lt;/intent-filter&gt;            </a:t>
+            </a:r>
+            <a:br>
+              <a:rPr kumimoji="0" lang="pt-BR" altLang="pt-BR" sz="1000" b="0" i="0" u="none" strike="noStrike" cap="none" normalizeH="0" baseline="0" smtClean="0">
+                <a:ln>
+                  <a:noFill/>
+                </a:ln>
+                <a:solidFill>
+                  <a:srgbClr val="E8BF6A"/>
+                </a:solidFill>
+                <a:effectLst/>
+                <a:latin typeface="JetBrains Mono"/>
+              </a:rPr>
+            </a:br>
+            <a:r>
+              <a:rPr kumimoji="0" lang="pt-BR" altLang="pt-BR" sz="1000" b="0" i="0" u="none" strike="noStrike" cap="none" normalizeH="0" baseline="0" smtClean="0">
+                <a:ln>
+                  <a:noFill/>
+                </a:ln>
+                <a:solidFill>
+                  <a:srgbClr val="E8BF6A"/>
+                </a:solidFill>
+                <a:effectLst/>
+                <a:latin typeface="JetBrains Mono"/>
+              </a:rPr>
+              <a:t>&lt;/activity&gt;</a:t>
+            </a:r>
+            <a:br>
+              <a:rPr kumimoji="0" lang="pt-BR" altLang="pt-BR" sz="1000" b="0" i="0" u="none" strike="noStrike" cap="none" normalizeH="0" baseline="0" smtClean="0">
+                <a:ln>
+                  <a:noFill/>
+                </a:ln>
+                <a:solidFill>
+                  <a:srgbClr val="E8BF6A"/>
+                </a:solidFill>
+                <a:effectLst/>
+                <a:latin typeface="JetBrains Mono"/>
+              </a:rPr>
+            </a:br>
+            <a:r>
+              <a:rPr kumimoji="0" lang="pt-BR" altLang="pt-BR" sz="1000" b="0" i="0" u="none" strike="noStrike" cap="none" normalizeH="0" baseline="0" smtClean="0">
+                <a:ln>
+                  <a:noFill/>
+                </a:ln>
+                <a:solidFill>
+                  <a:srgbClr val="E8BF6A"/>
+                </a:solidFill>
+                <a:effectLst/>
+                <a:latin typeface="JetBrains Mono"/>
+              </a:rPr>
+              <a:t>&lt;activity </a:t>
+            </a:r>
+            <a:r>
+              <a:rPr kumimoji="0" lang="pt-BR" altLang="pt-BR" sz="1000" b="0" i="0" u="none" strike="noStrike" cap="none" normalizeH="0" baseline="0" smtClean="0">
+                <a:ln>
+                  <a:noFill/>
+                </a:ln>
+                <a:solidFill>
+                  <a:srgbClr val="9876AA"/>
+                </a:solidFill>
+                <a:effectLst/>
+                <a:latin typeface="JetBrains Mono"/>
+              </a:rPr>
+              <a:t>android</a:t>
+            </a:r>
+            <a:r>
+              <a:rPr kumimoji="0" lang="pt-BR" altLang="pt-BR" sz="1000" b="0" i="0" u="none" strike="noStrike" cap="none" normalizeH="0" baseline="0" smtClean="0">
+                <a:ln>
+                  <a:noFill/>
+                </a:ln>
+                <a:solidFill>
+                  <a:srgbClr val="BABABA"/>
+                </a:solidFill>
+                <a:effectLst/>
+                <a:latin typeface="JetBrains Mono"/>
+              </a:rPr>
+              <a:t>:name</a:t>
+            </a:r>
+            <a:r>
+              <a:rPr kumimoji="0" lang="pt-BR" altLang="pt-BR" sz="1000" b="0" i="0" u="none" strike="noStrike" cap="none" normalizeH="0" baseline="0" smtClean="0">
+                <a:ln>
+                  <a:noFill/>
+                </a:ln>
+                <a:solidFill>
+                  <a:srgbClr val="6A8759"/>
+                </a:solidFill>
+                <a:effectLst/>
+                <a:latin typeface="JetBrains Mono"/>
+              </a:rPr>
+              <a:t>=".MainActivity"</a:t>
+            </a:r>
+            <a:r>
+              <a:rPr kumimoji="0" lang="pt-BR" altLang="pt-BR" sz="1000" b="0" i="0" u="none" strike="noStrike" cap="none" normalizeH="0" baseline="0" smtClean="0">
+                <a:ln>
+                  <a:noFill/>
+                </a:ln>
+                <a:solidFill>
+                  <a:srgbClr val="E8BF6A"/>
+                </a:solidFill>
+                <a:effectLst/>
+                <a:latin typeface="JetBrains Mono"/>
+              </a:rPr>
+              <a:t>&gt;</a:t>
+            </a:r>
+            <a:endParaRPr kumimoji="0" lang="pt-BR" altLang="pt-BR" sz="1800" b="0" i="0" u="none" strike="noStrike" cap="none" normalizeH="0" baseline="0" smtClean="0">
+              <a:ln>
+                <a:noFill/>
+              </a:ln>
+              <a:solidFill>
+                <a:schemeClr val="tx1"/>
+              </a:solidFill>
+              <a:effectLst/>
+              <a:latin typeface="Arial" panose="020B0604020202020204" pitchFamily="34" charset="0"/>
+            </a:endParaRPr>
+          </a:p>
+        </p:txBody>
+      </p:sp>
+      <p:sp>
+        <p:nvSpPr>
+          <p:cNvPr id="3" name="Retângulo 2"/>
+          <p:cNvSpPr/>
+          <p:nvPr/>
+        </p:nvSpPr>
+        <p:spPr>
+          <a:xfrm>
+            <a:off x="167268" y="479502"/>
+            <a:ext cx="4059044" cy="747132"/>
+          </a:xfrm>
+          <a:prstGeom prst="rect">
+            <a:avLst/>
+          </a:prstGeom>
+          <a:noFill/>
+          <a:ln>
+            <a:solidFill>
+              <a:srgbClr val="FF0000"/>
+            </a:solidFill>
+          </a:ln>
+        </p:spPr>
+        <p:style>
+          <a:lnRef idx="2">
+            <a:schemeClr val="accent1">
+              <a:shade val="50000"/>
+            </a:schemeClr>
+          </a:lnRef>
+          <a:fillRef idx="1">
+            <a:schemeClr val="accent1"/>
+          </a:fillRef>
+          <a:effectRef idx="0">
+            <a:schemeClr val="accent1"/>
+          </a:effectRef>
+          <a:fontRef idx="minor">
+            <a:schemeClr val="lt1"/>
+          </a:fontRef>
+        </p:style>
+        <p:txBody>
+          <a:bodyPr rtlCol="0" anchor="ctr"/>
+          <a:lstStyle/>
+          <a:p>
+            <a:pPr algn="ctr"/>
+            <a:endParaRPr lang="pt-BR"/>
+          </a:p>
+        </p:txBody>
+      </p:sp>
+      <p:sp>
+        <p:nvSpPr>
+          <p:cNvPr id="4" name="CaixaDeTexto 3"/>
+          <p:cNvSpPr txBox="1"/>
+          <p:nvPr/>
+        </p:nvSpPr>
+        <p:spPr>
+          <a:xfrm>
+            <a:off x="4226312" y="729733"/>
+            <a:ext cx="4274247" cy="369332"/>
+          </a:xfrm>
+          <a:prstGeom prst="rect">
+            <a:avLst/>
+          </a:prstGeom>
+          <a:noFill/>
+        </p:spPr>
+        <p:txBody>
+          <a:bodyPr wrap="none" rtlCol="0">
+            <a:spAutoFit/>
+          </a:bodyPr>
+          <a:lstStyle/>
+          <a:p>
+            <a:r>
+              <a:rPr lang="pt-BR" dirty="0" smtClean="0">
+                <a:solidFill>
+                  <a:srgbClr val="FF0000"/>
+                </a:solidFill>
+              </a:rPr>
+              <a:t>Identifica qual </a:t>
+            </a:r>
+            <a:r>
+              <a:rPr lang="pt-BR" dirty="0" err="1" smtClean="0">
+                <a:solidFill>
+                  <a:srgbClr val="FF0000"/>
+                </a:solidFill>
+              </a:rPr>
+              <a:t>activity</a:t>
+            </a:r>
+            <a:r>
+              <a:rPr lang="pt-BR" dirty="0" smtClean="0">
+                <a:solidFill>
+                  <a:srgbClr val="FF0000"/>
+                </a:solidFill>
+              </a:rPr>
+              <a:t> irá abrir por primeiro</a:t>
+            </a:r>
+            <a:endParaRPr lang="pt-BR" dirty="0">
+              <a:solidFill>
+                <a:srgbClr val="FF0000"/>
+              </a:solidFill>
+            </a:endParaRPr>
+          </a:p>
+        </p:txBody>
+      </p:sp>
+      <p:sp>
+        <p:nvSpPr>
+          <p:cNvPr id="5" name="CaixaDeTexto 4"/>
+          <p:cNvSpPr txBox="1"/>
+          <p:nvPr/>
+        </p:nvSpPr>
+        <p:spPr>
+          <a:xfrm>
+            <a:off x="2338908" y="190230"/>
+            <a:ext cx="864339" cy="307777"/>
+          </a:xfrm>
+          <a:prstGeom prst="rect">
+            <a:avLst/>
+          </a:prstGeom>
+          <a:noFill/>
+        </p:spPr>
+        <p:txBody>
+          <a:bodyPr wrap="none" rtlCol="0">
+            <a:spAutoFit/>
+          </a:bodyPr>
+          <a:lstStyle/>
+          <a:p>
+            <a:r>
+              <a:rPr lang="pt-BR" sz="1400" dirty="0" err="1" smtClean="0">
+                <a:solidFill>
+                  <a:srgbClr val="FF0000"/>
+                </a:solidFill>
+              </a:rPr>
+              <a:t>Activity</a:t>
+            </a:r>
+            <a:r>
+              <a:rPr lang="pt-BR" sz="1400" dirty="0" smtClean="0">
+                <a:solidFill>
+                  <a:srgbClr val="FF0000"/>
+                </a:solidFill>
+              </a:rPr>
+              <a:t> 1</a:t>
+            </a:r>
+            <a:endParaRPr lang="pt-BR" sz="1400" dirty="0">
+              <a:solidFill>
+                <a:srgbClr val="FF0000"/>
+              </a:solidFill>
+            </a:endParaRPr>
+          </a:p>
+        </p:txBody>
+      </p:sp>
+      <p:sp>
+        <p:nvSpPr>
+          <p:cNvPr id="6" name="CaixaDeTexto 5"/>
+          <p:cNvSpPr txBox="1"/>
+          <p:nvPr/>
+        </p:nvSpPr>
+        <p:spPr>
+          <a:xfrm>
+            <a:off x="2338907" y="1219940"/>
+            <a:ext cx="864339" cy="307777"/>
+          </a:xfrm>
+          <a:prstGeom prst="rect">
+            <a:avLst/>
+          </a:prstGeom>
+          <a:noFill/>
+        </p:spPr>
+        <p:txBody>
+          <a:bodyPr wrap="none" rtlCol="0">
+            <a:spAutoFit/>
+          </a:bodyPr>
+          <a:lstStyle/>
+          <a:p>
+            <a:r>
+              <a:rPr lang="pt-BR" sz="1400" dirty="0" err="1" smtClean="0">
+                <a:solidFill>
+                  <a:srgbClr val="FF0000"/>
+                </a:solidFill>
+              </a:rPr>
+              <a:t>Activity</a:t>
+            </a:r>
+            <a:r>
+              <a:rPr lang="pt-BR" sz="1400" dirty="0" smtClean="0">
+                <a:solidFill>
+                  <a:srgbClr val="FF0000"/>
+                </a:solidFill>
+              </a:rPr>
+              <a:t> 2</a:t>
+            </a:r>
+          </a:p>
+        </p:txBody>
+      </p:sp>
+      <p:pic>
+        <p:nvPicPr>
+          <p:cNvPr id="7" name="Imagem 6"/>
+          <p:cNvPicPr>
+            <a:picLocks noChangeAspect="1"/>
+          </p:cNvPicPr>
+          <p:nvPr/>
+        </p:nvPicPr>
+        <p:blipFill>
+          <a:blip r:embed="rId2"/>
+          <a:stretch>
+            <a:fillRect/>
+          </a:stretch>
+        </p:blipFill>
+        <p:spPr>
+          <a:xfrm>
+            <a:off x="167268" y="2190285"/>
+            <a:ext cx="1200150" cy="381000"/>
+          </a:xfrm>
+          <a:prstGeom prst="rect">
+            <a:avLst/>
+          </a:prstGeom>
+        </p:spPr>
+      </p:pic>
+      <p:pic>
+        <p:nvPicPr>
+          <p:cNvPr id="8" name="Imagem 7"/>
+          <p:cNvPicPr>
+            <a:picLocks noChangeAspect="1"/>
+          </p:cNvPicPr>
+          <p:nvPr/>
+        </p:nvPicPr>
+        <p:blipFill>
+          <a:blip r:embed="rId3"/>
+          <a:stretch>
+            <a:fillRect/>
+          </a:stretch>
+        </p:blipFill>
+        <p:spPr>
+          <a:xfrm>
+            <a:off x="167268" y="2803950"/>
+            <a:ext cx="2124075" cy="581025"/>
+          </a:xfrm>
+          <a:prstGeom prst="rect">
+            <a:avLst/>
+          </a:prstGeom>
+        </p:spPr>
+      </p:pic>
+      <p:pic>
+        <p:nvPicPr>
+          <p:cNvPr id="9" name="Imagem 8"/>
+          <p:cNvPicPr>
+            <a:picLocks noChangeAspect="1"/>
+          </p:cNvPicPr>
+          <p:nvPr/>
+        </p:nvPicPr>
+        <p:blipFill>
+          <a:blip r:embed="rId4"/>
+          <a:stretch>
+            <a:fillRect/>
+          </a:stretch>
+        </p:blipFill>
+        <p:spPr>
+          <a:xfrm>
+            <a:off x="167268" y="3617640"/>
+            <a:ext cx="1123950" cy="1200150"/>
+          </a:xfrm>
+          <a:prstGeom prst="rect">
+            <a:avLst/>
+          </a:prstGeom>
+        </p:spPr>
+      </p:pic>
+      <p:sp>
+        <p:nvSpPr>
+          <p:cNvPr id="10" name="CaixaDeTexto 9"/>
+          <p:cNvSpPr txBox="1"/>
+          <p:nvPr/>
+        </p:nvSpPr>
+        <p:spPr>
+          <a:xfrm>
+            <a:off x="1550435" y="2196119"/>
+            <a:ext cx="740908" cy="369332"/>
+          </a:xfrm>
+          <a:prstGeom prst="rect">
+            <a:avLst/>
+          </a:prstGeom>
+          <a:noFill/>
+        </p:spPr>
+        <p:txBody>
+          <a:bodyPr wrap="none" rtlCol="0">
+            <a:spAutoFit/>
+          </a:bodyPr>
+          <a:lstStyle/>
+          <a:p>
+            <a:r>
+              <a:rPr lang="pt-BR" dirty="0" smtClean="0"/>
+              <a:t>classe</a:t>
+            </a:r>
+            <a:endParaRPr lang="pt-BR" dirty="0"/>
+          </a:p>
+        </p:txBody>
+      </p:sp>
+      <p:sp>
+        <p:nvSpPr>
+          <p:cNvPr id="11" name="CaixaDeTexto 10"/>
+          <p:cNvSpPr txBox="1"/>
+          <p:nvPr/>
+        </p:nvSpPr>
+        <p:spPr>
+          <a:xfrm>
+            <a:off x="1550435" y="4033049"/>
+            <a:ext cx="482889" cy="369332"/>
+          </a:xfrm>
+          <a:prstGeom prst="rect">
+            <a:avLst/>
+          </a:prstGeom>
+          <a:noFill/>
+        </p:spPr>
+        <p:txBody>
+          <a:bodyPr wrap="none" rtlCol="0">
+            <a:spAutoFit/>
+          </a:bodyPr>
+          <a:lstStyle/>
+          <a:p>
+            <a:r>
+              <a:rPr lang="pt-BR" dirty="0" err="1" smtClean="0"/>
+              <a:t>get</a:t>
+            </a:r>
+            <a:endParaRPr lang="pt-BR" dirty="0"/>
+          </a:p>
+        </p:txBody>
+      </p:sp>
+      <p:sp>
+        <p:nvSpPr>
+          <p:cNvPr id="12" name="CaixaDeTexto 11"/>
+          <p:cNvSpPr txBox="1"/>
+          <p:nvPr/>
+        </p:nvSpPr>
+        <p:spPr>
+          <a:xfrm>
+            <a:off x="2338907" y="2909796"/>
+            <a:ext cx="465577" cy="369332"/>
+          </a:xfrm>
+          <a:prstGeom prst="rect">
+            <a:avLst/>
+          </a:prstGeom>
+          <a:noFill/>
+        </p:spPr>
+        <p:txBody>
+          <a:bodyPr wrap="none" rtlCol="0">
+            <a:spAutoFit/>
+          </a:bodyPr>
+          <a:lstStyle/>
+          <a:p>
+            <a:r>
+              <a:rPr lang="pt-BR" dirty="0" smtClean="0"/>
+              <a:t>set</a:t>
+            </a:r>
+            <a:endParaRPr lang="pt-BR" dirty="0"/>
+          </a:p>
+        </p:txBody>
+      </p:sp>
+      <p:sp>
+        <p:nvSpPr>
+          <p:cNvPr id="13" name="Rectangle 2"/>
+          <p:cNvSpPr>
+            <a:spLocks noChangeArrowheads="1"/>
+          </p:cNvSpPr>
+          <p:nvPr/>
+        </p:nvSpPr>
+        <p:spPr bwMode="auto">
+          <a:xfrm>
+            <a:off x="1367418" y="4479325"/>
+            <a:ext cx="3416455" cy="246221"/>
+          </a:xfrm>
+          <a:prstGeom prst="rect">
+            <a:avLst/>
+          </a:prstGeom>
+          <a:solidFill>
+            <a:srgbClr val="2B2B2B"/>
+          </a:solidFill>
+          <a:ln>
+            <a:noFill/>
+          </a:ln>
+          <a:effectLst/>
+          <a:extLst>
+            <a:ext uri="{91240B29-F687-4F45-9708-019B960494DF}">
+              <a14:hiddenLine xmlns:a14="http://schemas.microsoft.com/office/drawing/2010/main" w="9525">
+                <a:solidFill>
+                  <a:schemeClr val="tx1"/>
+                </a:solidFill>
+                <a:miter lim="800000"/>
+                <a:headEnd/>
+                <a:tailEnd/>
+              </a14:hiddenLine>
+            </a:ext>
+            <a:ext uri="{AF507438-7753-43E0-B8FC-AC1667EBCBE1}">
+              <a14:hiddenEffects xmlns:a14="http://schemas.microsoft.com/office/drawing/2010/main">
+                <a:effectLst>
+                  <a:outerShdw dist="35921" dir="2700000" algn="ctr" rotWithShape="0">
+                    <a:schemeClr val="bg2"/>
+                  </a:outerShdw>
+                </a:effectLst>
+              </a14:hiddenEffects>
+            </a:ext>
+          </a:extLst>
+        </p:spPr>
+        <p:txBody>
+          <a:bodyPr vert="horz" wrap="square" lIns="91440" tIns="45720" rIns="91440" bIns="45720" numCol="1" anchor="ctr" anchorCtr="0" compatLnSpc="1">
+            <a:prstTxWarp prst="textNoShape">
+              <a:avLst/>
+            </a:prstTxWarp>
+            <a:spAutoFit/>
+          </a:bodyPr>
+          <a:lstStyle/>
+          <a:p>
+            <a:pPr marL="0" marR="0" lvl="0" indent="0" algn="l" defTabSz="914400" rtl="0" eaLnBrk="0" fontAlgn="base" latinLnBrk="0" hangingPunct="0">
+              <a:lnSpc>
+                <a:spcPct val="100000"/>
+              </a:lnSpc>
+              <a:spcBef>
+                <a:spcPct val="0"/>
+              </a:spcBef>
+              <a:spcAft>
+                <a:spcPct val="0"/>
+              </a:spcAft>
+              <a:buClrTx/>
+              <a:buSzTx/>
+              <a:buFontTx/>
+              <a:buNone/>
+              <a:tabLst/>
+            </a:pPr>
+            <a:r>
+              <a:rPr kumimoji="0" lang="pt-BR" altLang="pt-BR" sz="1000" b="0" i="0" u="none" strike="noStrike" cap="none" normalizeH="0" baseline="0" smtClean="0">
+                <a:ln>
+                  <a:noFill/>
+                </a:ln>
+                <a:solidFill>
+                  <a:srgbClr val="CC7832"/>
+                </a:solidFill>
+                <a:effectLst/>
+                <a:latin typeface="JetBrains Mono"/>
+              </a:rPr>
+              <a:t>val </a:t>
+            </a:r>
+            <a:r>
+              <a:rPr kumimoji="0" lang="pt-BR" altLang="pt-BR" sz="1000" b="0" i="0" u="none" strike="noStrike" cap="none" normalizeH="0" baseline="0" smtClean="0">
+                <a:ln>
+                  <a:noFill/>
+                </a:ln>
+                <a:solidFill>
+                  <a:srgbClr val="A9B7C6"/>
+                </a:solidFill>
+                <a:effectLst/>
+                <a:latin typeface="JetBrains Mono"/>
+              </a:rPr>
+              <a:t>playerName = </a:t>
+            </a:r>
+            <a:r>
+              <a:rPr kumimoji="0" lang="pt-BR" altLang="pt-BR" sz="1000" b="0" i="1" u="none" strike="noStrike" cap="none" normalizeH="0" baseline="0" smtClean="0">
+                <a:ln>
+                  <a:noFill/>
+                </a:ln>
+                <a:solidFill>
+                  <a:srgbClr val="9876AA"/>
+                </a:solidFill>
+                <a:effectLst/>
+                <a:latin typeface="JetBrains Mono"/>
+              </a:rPr>
+              <a:t>intent</a:t>
+            </a:r>
+            <a:r>
+              <a:rPr kumimoji="0" lang="pt-BR" altLang="pt-BR" sz="1000" b="0" i="0" u="none" strike="noStrike" cap="none" normalizeH="0" baseline="0" smtClean="0">
+                <a:ln>
+                  <a:noFill/>
+                </a:ln>
+                <a:solidFill>
+                  <a:srgbClr val="A9B7C6"/>
+                </a:solidFill>
+                <a:effectLst/>
+                <a:latin typeface="JetBrains Mono"/>
+              </a:rPr>
+              <a:t>.getStringExtra(</a:t>
+            </a:r>
+            <a:r>
+              <a:rPr kumimoji="0" lang="pt-BR" altLang="pt-BR" sz="1000" b="0" i="0" u="none" strike="noStrike" cap="none" normalizeH="0" baseline="0" smtClean="0">
+                <a:ln>
+                  <a:noFill/>
+                </a:ln>
+                <a:solidFill>
+                  <a:srgbClr val="6A8759"/>
+                </a:solidFill>
+                <a:effectLst/>
+                <a:latin typeface="JetBrains Mono"/>
+              </a:rPr>
+              <a:t>"playername"</a:t>
+            </a:r>
+            <a:r>
+              <a:rPr kumimoji="0" lang="pt-BR" altLang="pt-BR" sz="1000" b="0" i="0" u="none" strike="noStrike" cap="none" normalizeH="0" baseline="0" smtClean="0">
+                <a:ln>
+                  <a:noFill/>
+                </a:ln>
+                <a:solidFill>
+                  <a:srgbClr val="A9B7C6"/>
+                </a:solidFill>
+                <a:effectLst/>
+                <a:latin typeface="JetBrains Mono"/>
+              </a:rPr>
+              <a:t>)</a:t>
+            </a:r>
+            <a:endParaRPr kumimoji="0" lang="pt-BR" altLang="pt-BR" sz="1800" b="0" i="0" u="none" strike="noStrike" cap="none" normalizeH="0" baseline="0" smtClean="0">
+              <a:ln>
+                <a:noFill/>
+              </a:ln>
+              <a:solidFill>
+                <a:schemeClr val="tx1"/>
+              </a:solidFill>
+              <a:effectLst/>
+              <a:latin typeface="Arial" panose="020B0604020202020204" pitchFamily="34" charset="0"/>
+            </a:endParaRPr>
+          </a:p>
+        </p:txBody>
+      </p:sp>
+      <p:sp>
+        <p:nvSpPr>
+          <p:cNvPr id="14" name="CaixaDeTexto 13"/>
+          <p:cNvSpPr txBox="1"/>
+          <p:nvPr/>
+        </p:nvSpPr>
+        <p:spPr>
+          <a:xfrm>
+            <a:off x="6746488" y="2909796"/>
+            <a:ext cx="4583499" cy="369332"/>
+          </a:xfrm>
+          <a:prstGeom prst="rect">
+            <a:avLst/>
+          </a:prstGeom>
+          <a:noFill/>
+        </p:spPr>
+        <p:txBody>
+          <a:bodyPr wrap="none" rtlCol="0">
+            <a:spAutoFit/>
+          </a:bodyPr>
+          <a:lstStyle/>
+          <a:p>
+            <a:r>
+              <a:rPr lang="pt-BR" dirty="0" smtClean="0"/>
+              <a:t>Para acessar um </a:t>
+            </a:r>
+            <a:r>
+              <a:rPr lang="pt-BR" dirty="0" err="1" smtClean="0"/>
+              <a:t>Resource</a:t>
+            </a:r>
+            <a:r>
+              <a:rPr lang="pt-BR" dirty="0" smtClean="0"/>
+              <a:t> de uma classe </a:t>
+            </a:r>
+            <a:r>
+              <a:rPr lang="pt-BR" dirty="0" err="1" smtClean="0"/>
+              <a:t>kotlin</a:t>
+            </a:r>
+            <a:endParaRPr lang="pt-BR" dirty="0"/>
+          </a:p>
+        </p:txBody>
+      </p:sp>
+      <p:sp>
+        <p:nvSpPr>
+          <p:cNvPr id="15" name="Seta para baixo 14"/>
+          <p:cNvSpPr/>
+          <p:nvPr/>
+        </p:nvSpPr>
+        <p:spPr>
+          <a:xfrm>
+            <a:off x="8769398" y="1890131"/>
+            <a:ext cx="537678" cy="981307"/>
+          </a:xfrm>
+          <a:prstGeom prst="downArrow">
+            <a:avLst/>
+          </a:prstGeom>
+          <a:solidFill>
+            <a:srgbClr val="FF0000"/>
+          </a:solidFill>
+        </p:spPr>
+        <p:style>
+          <a:lnRef idx="2">
+            <a:schemeClr val="accent1">
+              <a:shade val="50000"/>
+            </a:schemeClr>
+          </a:lnRef>
+          <a:fillRef idx="1">
+            <a:schemeClr val="accent1"/>
+          </a:fillRef>
+          <a:effectRef idx="0">
+            <a:schemeClr val="accent1"/>
+          </a:effectRef>
+          <a:fontRef idx="minor">
+            <a:schemeClr val="lt1"/>
+          </a:fontRef>
+        </p:style>
+        <p:txBody>
+          <a:bodyPr rtlCol="0" anchor="ctr"/>
+          <a:lstStyle/>
+          <a:p>
+            <a:pPr algn="ctr"/>
+            <a:endParaRPr lang="pt-BR"/>
+          </a:p>
+        </p:txBody>
+      </p:sp>
+      <p:sp>
+        <p:nvSpPr>
+          <p:cNvPr id="16" name="Rectangle 3"/>
+          <p:cNvSpPr>
+            <a:spLocks noChangeArrowheads="1"/>
+          </p:cNvSpPr>
+          <p:nvPr/>
+        </p:nvSpPr>
+        <p:spPr bwMode="auto">
+          <a:xfrm>
+            <a:off x="7047918" y="3558191"/>
+            <a:ext cx="4282069" cy="369332"/>
+          </a:xfrm>
+          <a:prstGeom prst="rect">
+            <a:avLst/>
+          </a:prstGeom>
+          <a:solidFill>
+            <a:srgbClr val="2B2B2B"/>
+          </a:solidFill>
+          <a:ln>
+            <a:noFill/>
+          </a:ln>
+          <a:effectLst/>
+          <a:extLst>
+            <a:ext uri="{91240B29-F687-4F45-9708-019B960494DF}">
+              <a14:hiddenLine xmlns:a14="http://schemas.microsoft.com/office/drawing/2010/main" w="9525">
+                <a:solidFill>
+                  <a:schemeClr val="tx1"/>
+                </a:solidFill>
+                <a:miter lim="800000"/>
+                <a:headEnd/>
+                <a:tailEnd/>
+              </a14:hiddenLine>
+            </a:ext>
+            <a:ext uri="{AF507438-7753-43E0-B8FC-AC1667EBCBE1}">
+              <a14:hiddenEffects xmlns:a14="http://schemas.microsoft.com/office/drawing/2010/main">
+                <a:effectLst>
+                  <a:outerShdw dist="35921" dir="2700000" algn="ctr" rotWithShape="0">
+                    <a:schemeClr val="bg2"/>
+                  </a:outerShdw>
+                </a:effectLst>
+              </a14:hiddenEffects>
+            </a:ext>
+          </a:extLst>
+        </p:spPr>
+        <p:txBody>
+          <a:bodyPr vert="horz" wrap="square" lIns="91440" tIns="45720" rIns="91440" bIns="45720" numCol="1" anchor="ctr" anchorCtr="0" compatLnSpc="1">
+            <a:prstTxWarp prst="textNoShape">
+              <a:avLst/>
+            </a:prstTxWarp>
+            <a:spAutoFit/>
+          </a:bodyPr>
+          <a:lstStyle/>
+          <a:p>
+            <a:pPr marL="0" marR="0" lvl="0" indent="0" algn="l" defTabSz="914400" rtl="0" eaLnBrk="0" fontAlgn="base" latinLnBrk="0" hangingPunct="0">
+              <a:lnSpc>
+                <a:spcPct val="100000"/>
+              </a:lnSpc>
+              <a:spcBef>
+                <a:spcPct val="0"/>
+              </a:spcBef>
+              <a:spcAft>
+                <a:spcPct val="0"/>
+              </a:spcAft>
+              <a:buClrTx/>
+              <a:buSzTx/>
+              <a:buFontTx/>
+              <a:buNone/>
+              <a:tabLst/>
+            </a:pPr>
+            <a:r>
+              <a:rPr kumimoji="0" lang="pt-BR" altLang="pt-BR" b="0" i="1" u="none" strike="noStrike" cap="none" normalizeH="0" baseline="0" dirty="0" err="1" smtClean="0">
+                <a:ln>
+                  <a:noFill/>
+                </a:ln>
+                <a:solidFill>
+                  <a:srgbClr val="9876AA"/>
+                </a:solidFill>
+                <a:effectLst/>
+                <a:latin typeface="JetBrains Mono"/>
+              </a:rPr>
+              <a:t>resources</a:t>
+            </a:r>
+            <a:r>
+              <a:rPr kumimoji="0" lang="pt-BR" altLang="pt-BR" b="0" i="0" u="none" strike="noStrike" cap="none" normalizeH="0" baseline="0" dirty="0" err="1" smtClean="0">
+                <a:ln>
+                  <a:noFill/>
+                </a:ln>
+                <a:solidFill>
+                  <a:srgbClr val="A9B7C6"/>
+                </a:solidFill>
+                <a:effectLst/>
+                <a:latin typeface="JetBrains Mono"/>
+              </a:rPr>
+              <a:t>.getString</a:t>
+            </a:r>
+            <a:r>
+              <a:rPr kumimoji="0" lang="pt-BR" altLang="pt-BR" b="0" i="0" u="none" strike="noStrike" cap="none" normalizeH="0" baseline="0" dirty="0" smtClean="0">
+                <a:ln>
+                  <a:noFill/>
+                </a:ln>
+                <a:solidFill>
+                  <a:srgbClr val="A9B7C6"/>
+                </a:solidFill>
+                <a:effectLst/>
+                <a:latin typeface="JetBrains Mono"/>
+              </a:rPr>
+              <a:t>(</a:t>
+            </a:r>
+            <a:r>
+              <a:rPr kumimoji="0" lang="pt-BR" altLang="pt-BR" b="0" i="0" u="none" strike="noStrike" cap="none" normalizeH="0" baseline="0" dirty="0" err="1" smtClean="0">
+                <a:ln>
+                  <a:noFill/>
+                </a:ln>
+                <a:solidFill>
+                  <a:srgbClr val="A9B7C6"/>
+                </a:solidFill>
+                <a:effectLst/>
+                <a:latin typeface="JetBrains Mono"/>
+              </a:rPr>
+              <a:t>R.string.</a:t>
+            </a:r>
+            <a:r>
+              <a:rPr kumimoji="0" lang="pt-BR" altLang="pt-BR" b="0" i="1" u="none" strike="noStrike" cap="none" normalizeH="0" baseline="0" dirty="0" err="1" smtClean="0">
+                <a:ln>
+                  <a:noFill/>
+                </a:ln>
+                <a:solidFill>
+                  <a:srgbClr val="9876AA"/>
+                </a:solidFill>
+                <a:effectLst/>
+                <a:latin typeface="JetBrains Mono"/>
+              </a:rPr>
+              <a:t>Welcome</a:t>
+            </a:r>
+            <a:r>
+              <a:rPr kumimoji="0" lang="pt-BR" altLang="pt-BR" b="0" i="0" u="none" strike="noStrike" cap="none" normalizeH="0" baseline="0" dirty="0" smtClean="0">
+                <a:ln>
+                  <a:noFill/>
+                </a:ln>
+                <a:solidFill>
+                  <a:srgbClr val="A9B7C6"/>
+                </a:solidFill>
+                <a:effectLst/>
+                <a:latin typeface="JetBrains Mono"/>
+              </a:rPr>
+              <a:t>)</a:t>
+            </a:r>
+            <a:endParaRPr kumimoji="0" lang="pt-BR" altLang="pt-BR" sz="4000" b="0" i="0" u="none" strike="noStrike" cap="none" normalizeH="0" baseline="0" dirty="0" smtClean="0">
+              <a:ln>
+                <a:noFill/>
+              </a:ln>
+              <a:solidFill>
+                <a:schemeClr val="tx1"/>
+              </a:solidFill>
+              <a:effectLst/>
+              <a:latin typeface="Arial" panose="020B0604020202020204" pitchFamily="34" charset="0"/>
+            </a:endParaRPr>
+          </a:p>
+        </p:txBody>
+      </p:sp>
+      <p:sp>
+        <p:nvSpPr>
+          <p:cNvPr id="17" name="CaixaDeTexto 16"/>
+          <p:cNvSpPr txBox="1"/>
+          <p:nvPr/>
+        </p:nvSpPr>
+        <p:spPr>
+          <a:xfrm>
+            <a:off x="6066263" y="4402381"/>
+            <a:ext cx="5300425" cy="646331"/>
+          </a:xfrm>
+          <a:prstGeom prst="rect">
+            <a:avLst/>
+          </a:prstGeom>
+          <a:noFill/>
+        </p:spPr>
+        <p:txBody>
+          <a:bodyPr wrap="none" rtlCol="0">
+            <a:spAutoFit/>
+          </a:bodyPr>
+          <a:lstStyle/>
+          <a:p>
+            <a:r>
+              <a:rPr lang="pt-BR" dirty="0" smtClean="0"/>
+              <a:t>Fazer </a:t>
+            </a:r>
+            <a:r>
+              <a:rPr lang="pt-BR" dirty="0" err="1" smtClean="0"/>
+              <a:t>place</a:t>
+            </a:r>
+            <a:r>
+              <a:rPr lang="pt-BR" dirty="0" smtClean="0"/>
+              <a:t> </a:t>
+            </a:r>
+            <a:r>
+              <a:rPr lang="pt-BR" dirty="0" err="1" smtClean="0"/>
+              <a:t>holder</a:t>
+            </a:r>
+            <a:r>
+              <a:rPr lang="pt-BR" dirty="0" smtClean="0"/>
+              <a:t>(nome que aparece antes de digitar)</a:t>
+            </a:r>
+          </a:p>
+          <a:p>
+            <a:r>
+              <a:rPr lang="pt-BR" dirty="0" smtClean="0"/>
+              <a:t> em um campo de texto (</a:t>
+            </a:r>
+            <a:r>
+              <a:rPr lang="pt-BR" dirty="0" err="1" smtClean="0"/>
+              <a:t>hint</a:t>
+            </a:r>
+            <a:r>
+              <a:rPr lang="pt-BR" dirty="0" smtClean="0"/>
+              <a:t>)</a:t>
+            </a:r>
+            <a:endParaRPr lang="pt-BR" dirty="0"/>
+          </a:p>
+        </p:txBody>
+      </p:sp>
+      <p:sp>
+        <p:nvSpPr>
+          <p:cNvPr id="18" name="Rectangle 4"/>
+          <p:cNvSpPr>
+            <a:spLocks noChangeArrowheads="1"/>
+          </p:cNvSpPr>
+          <p:nvPr/>
+        </p:nvSpPr>
+        <p:spPr bwMode="auto">
+          <a:xfrm>
+            <a:off x="7047918" y="5244001"/>
+            <a:ext cx="3668751" cy="307777"/>
+          </a:xfrm>
+          <a:prstGeom prst="rect">
+            <a:avLst/>
+          </a:prstGeom>
+          <a:solidFill>
+            <a:srgbClr val="2B2B2B"/>
+          </a:solidFill>
+          <a:ln>
+            <a:noFill/>
+          </a:ln>
+          <a:effectLst/>
+          <a:extLst>
+            <a:ext uri="{91240B29-F687-4F45-9708-019B960494DF}">
+              <a14:hiddenLine xmlns:a14="http://schemas.microsoft.com/office/drawing/2010/main" w="9525">
+                <a:solidFill>
+                  <a:schemeClr val="tx1"/>
+                </a:solidFill>
+                <a:miter lim="800000"/>
+                <a:headEnd/>
+                <a:tailEnd/>
+              </a14:hiddenLine>
+            </a:ext>
+            <a:ext uri="{AF507438-7753-43E0-B8FC-AC1667EBCBE1}">
+              <a14:hiddenEffects xmlns:a14="http://schemas.microsoft.com/office/drawing/2010/main">
+                <a:effectLst>
+                  <a:outerShdw dist="35921" dir="2700000" algn="ctr" rotWithShape="0">
+                    <a:schemeClr val="bg2"/>
+                  </a:outerShdw>
+                </a:effectLst>
+              </a14:hiddenEffects>
+            </a:ext>
+          </a:extLst>
+        </p:spPr>
+        <p:txBody>
+          <a:bodyPr vert="horz" wrap="square" lIns="91440" tIns="45720" rIns="91440" bIns="45720" numCol="1" anchor="ctr" anchorCtr="0" compatLnSpc="1">
+            <a:prstTxWarp prst="textNoShape">
+              <a:avLst/>
+            </a:prstTxWarp>
+            <a:spAutoFit/>
+          </a:bodyPr>
+          <a:lstStyle/>
+          <a:p>
+            <a:pPr marL="0" marR="0" lvl="0" indent="0" algn="l" defTabSz="914400" rtl="0" eaLnBrk="0" fontAlgn="base" latinLnBrk="0" hangingPunct="0">
+              <a:lnSpc>
+                <a:spcPct val="100000"/>
+              </a:lnSpc>
+              <a:spcBef>
+                <a:spcPct val="0"/>
+              </a:spcBef>
+              <a:spcAft>
+                <a:spcPct val="0"/>
+              </a:spcAft>
+              <a:buClrTx/>
+              <a:buSzTx/>
+              <a:buFontTx/>
+              <a:buNone/>
+              <a:tabLst/>
+            </a:pPr>
+            <a:r>
+              <a:rPr kumimoji="0" lang="pt-BR" altLang="pt-BR" sz="1400" b="0" i="0" u="none" strike="noStrike" cap="none" normalizeH="0" baseline="0" smtClean="0">
+                <a:ln>
+                  <a:noFill/>
+                </a:ln>
+                <a:solidFill>
+                  <a:srgbClr val="9876AA"/>
+                </a:solidFill>
+                <a:effectLst/>
+                <a:latin typeface="JetBrains Mono"/>
+              </a:rPr>
+              <a:t>android</a:t>
+            </a:r>
+            <a:r>
+              <a:rPr kumimoji="0" lang="pt-BR" altLang="pt-BR" sz="1400" b="0" i="0" u="none" strike="noStrike" cap="none" normalizeH="0" baseline="0" smtClean="0">
+                <a:ln>
+                  <a:noFill/>
+                </a:ln>
+                <a:solidFill>
+                  <a:srgbClr val="BABABA"/>
+                </a:solidFill>
+                <a:effectLst/>
+                <a:latin typeface="JetBrains Mono"/>
+              </a:rPr>
+              <a:t>:hint</a:t>
+            </a:r>
+            <a:r>
+              <a:rPr kumimoji="0" lang="pt-BR" altLang="pt-BR" sz="1400" b="0" i="0" u="none" strike="noStrike" cap="none" normalizeH="0" baseline="0" smtClean="0">
+                <a:ln>
+                  <a:noFill/>
+                </a:ln>
+                <a:solidFill>
+                  <a:srgbClr val="6A8759"/>
+                </a:solidFill>
+                <a:effectLst/>
+                <a:latin typeface="JetBrains Mono"/>
+              </a:rPr>
+              <a:t>="@string/UserName"</a:t>
+            </a:r>
+            <a:endParaRPr kumimoji="0" lang="pt-BR" altLang="pt-BR" sz="3200" b="0" i="0" u="none" strike="noStrike" cap="none" normalizeH="0" baseline="0" smtClean="0">
+              <a:ln>
+                <a:noFill/>
+              </a:ln>
+              <a:solidFill>
+                <a:schemeClr val="tx1"/>
+              </a:solidFill>
+              <a:effectLst/>
+              <a:latin typeface="Arial" panose="020B0604020202020204" pitchFamily="34" charset="0"/>
+            </a:endParaRPr>
+          </a:p>
+        </p:txBody>
+      </p:sp>
     </p:spTree>
     <p:extLst>
       <p:ext uri="{BB962C8B-B14F-4D97-AF65-F5344CB8AC3E}">
         <p14:creationId xmlns:p14="http://schemas.microsoft.com/office/powerpoint/2010/main" val="1153023018"/>
+      </p:ext>
+    </p:extLst>
+  </p:cSld>
+  <p:clrMapOvr>
+    <a:masterClrMapping/>
+  </p:clrMapOvr>
+</p:sld>
+</file>
+
+<file path=ppt/slides/slide5.xml><?xml version="1.0" encoding="utf-8"?>
+<p:sld xmlns:a="http://schemas.openxmlformats.org/drawingml/2006/main" xmlns:r="http://schemas.openxmlformats.org/officeDocument/2006/relationships" xmlns:p="http://schemas.openxmlformats.org/presentationml/2006/main">
+  <p:cSld>
+    <p:spTree>
+      <p:nvGrpSpPr>
+        <p:cNvPr id="1" name=""/>
+        <p:cNvGrpSpPr/>
+        <p:nvPr/>
+      </p:nvGrpSpPr>
+      <p:grpSpPr>
+        <a:xfrm>
+          <a:off x="0" y="0"/>
+          <a:ext cx="0" cy="0"/>
+          <a:chOff x="0" y="0"/>
+          <a:chExt cx="0" cy="0"/>
+        </a:xfrm>
+      </p:grpSpPr>
+      <p:sp>
+        <p:nvSpPr>
+          <p:cNvPr id="2" name="CaixaDeTexto 1"/>
+          <p:cNvSpPr txBox="1"/>
+          <p:nvPr/>
+        </p:nvSpPr>
+        <p:spPr>
+          <a:xfrm>
+            <a:off x="144967" y="0"/>
+            <a:ext cx="4607543" cy="369332"/>
+          </a:xfrm>
+          <a:prstGeom prst="rect">
+            <a:avLst/>
+          </a:prstGeom>
+          <a:noFill/>
+        </p:spPr>
+        <p:txBody>
+          <a:bodyPr wrap="none" rtlCol="0">
+            <a:spAutoFit/>
+          </a:bodyPr>
+          <a:lstStyle/>
+          <a:p>
+            <a:r>
+              <a:rPr lang="pt-BR" dirty="0" smtClean="0"/>
+              <a:t>Concatenar itens dentro de uma </a:t>
+            </a:r>
+            <a:r>
+              <a:rPr lang="pt-BR" dirty="0" err="1" smtClean="0"/>
+              <a:t>string</a:t>
+            </a:r>
+            <a:r>
+              <a:rPr lang="pt-BR" dirty="0" smtClean="0"/>
+              <a:t> usar %s </a:t>
+            </a:r>
+            <a:endParaRPr lang="pt-BR" dirty="0"/>
+          </a:p>
+        </p:txBody>
+      </p:sp>
+      <p:grpSp>
+        <p:nvGrpSpPr>
+          <p:cNvPr id="5" name="Grupo 4"/>
+          <p:cNvGrpSpPr/>
+          <p:nvPr/>
+        </p:nvGrpSpPr>
+        <p:grpSpPr>
+          <a:xfrm>
+            <a:off x="343033" y="518306"/>
+            <a:ext cx="3646448" cy="518757"/>
+            <a:chOff x="343033" y="518306"/>
+            <a:chExt cx="3646448" cy="518757"/>
+          </a:xfrm>
+        </p:grpSpPr>
+        <p:sp>
+          <p:nvSpPr>
+            <p:cNvPr id="3" name="Rectangle 1"/>
+            <p:cNvSpPr>
+              <a:spLocks noChangeArrowheads="1"/>
+            </p:cNvSpPr>
+            <p:nvPr/>
+          </p:nvSpPr>
+          <p:spPr bwMode="auto">
+            <a:xfrm>
+              <a:off x="343033" y="662826"/>
+              <a:ext cx="3646448" cy="246221"/>
+            </a:xfrm>
+            <a:prstGeom prst="rect">
+              <a:avLst/>
+            </a:prstGeom>
+            <a:solidFill>
+              <a:srgbClr val="2B2B2B"/>
+            </a:solidFill>
+            <a:ln>
+              <a:noFill/>
+            </a:ln>
+            <a:effectLst/>
+            <a:extLst>
+              <a:ext uri="{91240B29-F687-4F45-9708-019B960494DF}">
+                <a14:hiddenLine xmlns:a14="http://schemas.microsoft.com/office/drawing/2010/main" w="9525">
+                  <a:solidFill>
+                    <a:schemeClr val="tx1"/>
+                  </a:solidFill>
+                  <a:miter lim="800000"/>
+                  <a:headEnd/>
+                  <a:tailEnd/>
+                </a14:hiddenLine>
+              </a:ext>
+              <a:ext uri="{AF507438-7753-43E0-B8FC-AC1667EBCBE1}">
+                <a14:hiddenEffects xmlns:a14="http://schemas.microsoft.com/office/drawing/2010/main">
+                  <a:effectLst>
+                    <a:outerShdw dist="35921" dir="2700000" algn="ctr" rotWithShape="0">
+                      <a:schemeClr val="bg2"/>
+                    </a:outerShdw>
+                  </a:effectLst>
+                </a14:hiddenEffects>
+              </a:ext>
+            </a:extLst>
+          </p:spPr>
+          <p:txBody>
+            <a:bodyPr vert="horz" wrap="square" lIns="91440" tIns="45720" rIns="91440" bIns="45720" numCol="1" anchor="ctr" anchorCtr="0" compatLnSpc="1">
+              <a:prstTxWarp prst="textNoShape">
+                <a:avLst/>
+              </a:prstTxWarp>
+              <a:spAutoFit/>
+            </a:bodyPr>
+            <a:lstStyle/>
+            <a:p>
+              <a:pPr marL="0" marR="0" lvl="0" indent="0" algn="l" defTabSz="914400" rtl="0" eaLnBrk="0" fontAlgn="base" latinLnBrk="0" hangingPunct="0">
+                <a:lnSpc>
+                  <a:spcPct val="100000"/>
+                </a:lnSpc>
+                <a:spcBef>
+                  <a:spcPct val="0"/>
+                </a:spcBef>
+                <a:spcAft>
+                  <a:spcPct val="0"/>
+                </a:spcAft>
+                <a:buClrTx/>
+                <a:buSzTx/>
+                <a:buFontTx/>
+                <a:buNone/>
+                <a:tabLst/>
+              </a:pPr>
+              <a:r>
+                <a:rPr kumimoji="0" lang="pt-BR" altLang="pt-BR" sz="1000" b="0" i="0" u="none" strike="noStrike" cap="none" normalizeH="0" baseline="0" dirty="0" smtClean="0">
+                  <a:ln>
+                    <a:noFill/>
+                  </a:ln>
+                  <a:solidFill>
+                    <a:srgbClr val="E8BF6A"/>
+                  </a:solidFill>
+                  <a:effectLst/>
+                  <a:latin typeface="JetBrains Mono"/>
+                </a:rPr>
+                <a:t>&lt;</a:t>
+              </a:r>
+              <a:r>
+                <a:rPr kumimoji="0" lang="pt-BR" altLang="pt-BR" sz="1000" b="0" i="0" u="none" strike="noStrike" cap="none" normalizeH="0" baseline="0" dirty="0" err="1" smtClean="0">
+                  <a:ln>
+                    <a:noFill/>
+                  </a:ln>
+                  <a:solidFill>
+                    <a:srgbClr val="E8BF6A"/>
+                  </a:solidFill>
+                  <a:effectLst/>
+                  <a:latin typeface="JetBrains Mono"/>
+                </a:rPr>
+                <a:t>string</a:t>
+              </a:r>
+              <a:r>
+                <a:rPr kumimoji="0" lang="pt-BR" altLang="pt-BR" sz="1000" b="0" i="0" u="none" strike="noStrike" cap="none" normalizeH="0" baseline="0" dirty="0" smtClean="0">
+                  <a:ln>
+                    <a:noFill/>
+                  </a:ln>
+                  <a:solidFill>
+                    <a:srgbClr val="E8BF6A"/>
+                  </a:solidFill>
+                  <a:effectLst/>
+                  <a:latin typeface="JetBrains Mono"/>
+                </a:rPr>
+                <a:t> </a:t>
+              </a:r>
+              <a:r>
+                <a:rPr kumimoji="0" lang="pt-BR" altLang="pt-BR" sz="1000" b="0" i="0" u="none" strike="noStrike" cap="none" normalizeH="0" baseline="0" dirty="0" err="1" smtClean="0">
+                  <a:ln>
+                    <a:noFill/>
+                  </a:ln>
+                  <a:solidFill>
+                    <a:srgbClr val="BABABA"/>
+                  </a:solidFill>
+                  <a:effectLst/>
+                  <a:latin typeface="JetBrains Mono"/>
+                </a:rPr>
+                <a:t>name</a:t>
+              </a:r>
+              <a:r>
+                <a:rPr kumimoji="0" lang="pt-BR" altLang="pt-BR" sz="1000" b="0" i="0" u="none" strike="noStrike" cap="none" normalizeH="0" baseline="0" dirty="0" smtClean="0">
+                  <a:ln>
+                    <a:noFill/>
+                  </a:ln>
+                  <a:solidFill>
+                    <a:srgbClr val="6A8759"/>
+                  </a:solidFill>
+                  <a:effectLst/>
+                  <a:latin typeface="JetBrains Mono"/>
+                </a:rPr>
+                <a:t>="</a:t>
+              </a:r>
+              <a:r>
+                <a:rPr kumimoji="0" lang="pt-BR" altLang="pt-BR" sz="1000" b="0" i="0" u="none" strike="noStrike" cap="none" normalizeH="0" baseline="0" dirty="0" err="1" smtClean="0">
+                  <a:ln>
+                    <a:noFill/>
+                  </a:ln>
+                  <a:solidFill>
+                    <a:srgbClr val="6A8759"/>
+                  </a:solidFill>
+                  <a:effectLst/>
+                  <a:latin typeface="JetBrains Mono"/>
+                </a:rPr>
+                <a:t>Welcome</a:t>
+              </a:r>
+              <a:r>
+                <a:rPr kumimoji="0" lang="pt-BR" altLang="pt-BR" sz="1000" b="0" i="0" u="none" strike="noStrike" cap="none" normalizeH="0" baseline="0" dirty="0" smtClean="0">
+                  <a:ln>
+                    <a:noFill/>
+                  </a:ln>
+                  <a:solidFill>
+                    <a:srgbClr val="6A8759"/>
+                  </a:solidFill>
+                  <a:effectLst/>
+                  <a:latin typeface="JetBrains Mono"/>
+                </a:rPr>
+                <a:t>"</a:t>
+              </a:r>
+              <a:r>
+                <a:rPr kumimoji="0" lang="pt-BR" altLang="pt-BR" sz="1000" b="0" i="0" u="none" strike="noStrike" cap="none" normalizeH="0" baseline="0" dirty="0" smtClean="0">
+                  <a:ln>
+                    <a:noFill/>
+                  </a:ln>
+                  <a:solidFill>
+                    <a:srgbClr val="E8BF6A"/>
+                  </a:solidFill>
+                  <a:effectLst/>
+                  <a:latin typeface="JetBrains Mono"/>
+                </a:rPr>
+                <a:t>&gt;</a:t>
+              </a:r>
+              <a:r>
+                <a:rPr kumimoji="0" lang="pt-BR" altLang="pt-BR" sz="1000" b="0" i="0" u="none" strike="noStrike" cap="none" normalizeH="0" baseline="0" dirty="0" smtClean="0">
+                  <a:ln>
+                    <a:noFill/>
+                  </a:ln>
+                  <a:solidFill>
+                    <a:srgbClr val="A9B7C6"/>
+                  </a:solidFill>
+                  <a:effectLst/>
+                  <a:latin typeface="JetBrains Mono"/>
+                </a:rPr>
+                <a:t>Seja Bem Vindo %s</a:t>
+              </a:r>
+              <a:r>
+                <a:rPr kumimoji="0" lang="pt-BR" altLang="pt-BR" sz="1000" b="0" i="0" u="none" strike="noStrike" cap="none" normalizeH="0" baseline="0" dirty="0" smtClean="0">
+                  <a:ln>
+                    <a:noFill/>
+                  </a:ln>
+                  <a:solidFill>
+                    <a:srgbClr val="E8BF6A"/>
+                  </a:solidFill>
+                  <a:effectLst/>
+                  <a:latin typeface="JetBrains Mono"/>
+                </a:rPr>
+                <a:t>&lt;/</a:t>
+              </a:r>
+              <a:r>
+                <a:rPr kumimoji="0" lang="pt-BR" altLang="pt-BR" sz="1000" b="0" i="0" u="none" strike="noStrike" cap="none" normalizeH="0" baseline="0" dirty="0" err="1" smtClean="0">
+                  <a:ln>
+                    <a:noFill/>
+                  </a:ln>
+                  <a:solidFill>
+                    <a:srgbClr val="E8BF6A"/>
+                  </a:solidFill>
+                  <a:effectLst/>
+                  <a:latin typeface="JetBrains Mono"/>
+                </a:rPr>
+                <a:t>string</a:t>
+              </a:r>
+              <a:r>
+                <a:rPr kumimoji="0" lang="pt-BR" altLang="pt-BR" sz="1000" b="0" i="0" u="none" strike="noStrike" cap="none" normalizeH="0" baseline="0" dirty="0" smtClean="0">
+                  <a:ln>
+                    <a:noFill/>
+                  </a:ln>
+                  <a:solidFill>
+                    <a:srgbClr val="E8BF6A"/>
+                  </a:solidFill>
+                  <a:effectLst/>
+                  <a:latin typeface="JetBrains Mono"/>
+                </a:rPr>
+                <a:t>&gt;</a:t>
+              </a:r>
+              <a:endParaRPr kumimoji="0" lang="pt-BR" altLang="pt-BR" sz="1800" b="0" i="0" u="none" strike="noStrike" cap="none" normalizeH="0" baseline="0" dirty="0" smtClean="0">
+                <a:ln>
+                  <a:noFill/>
+                </a:ln>
+                <a:solidFill>
+                  <a:schemeClr val="tx1"/>
+                </a:solidFill>
+                <a:effectLst/>
+                <a:latin typeface="Arial" panose="020B0604020202020204" pitchFamily="34" charset="0"/>
+              </a:endParaRPr>
+            </a:p>
+          </p:txBody>
+        </p:sp>
+        <p:sp>
+          <p:nvSpPr>
+            <p:cNvPr id="4" name="Retângulo 3"/>
+            <p:cNvSpPr/>
+            <p:nvPr/>
+          </p:nvSpPr>
+          <p:spPr>
+            <a:xfrm>
+              <a:off x="2776653" y="518306"/>
+              <a:ext cx="245327" cy="518757"/>
+            </a:xfrm>
+            <a:prstGeom prst="rect">
+              <a:avLst/>
+            </a:prstGeom>
+            <a:noFill/>
+            <a:ln>
+              <a:solidFill>
+                <a:srgbClr val="FF0000"/>
+              </a:solidFill>
+            </a:ln>
+          </p:spPr>
+          <p:style>
+            <a:lnRef idx="2">
+              <a:schemeClr val="accent1">
+                <a:shade val="50000"/>
+              </a:schemeClr>
+            </a:lnRef>
+            <a:fillRef idx="1">
+              <a:schemeClr val="accent1"/>
+            </a:fillRef>
+            <a:effectRef idx="0">
+              <a:schemeClr val="accent1"/>
+            </a:effectRef>
+            <a:fontRef idx="minor">
+              <a:schemeClr val="lt1"/>
+            </a:fontRef>
+          </p:style>
+          <p:txBody>
+            <a:bodyPr rtlCol="0" anchor="ctr"/>
+            <a:lstStyle/>
+            <a:p>
+              <a:pPr algn="ctr"/>
+              <a:endParaRPr lang="pt-BR"/>
+            </a:p>
+          </p:txBody>
+        </p:sp>
+      </p:grpSp>
+      <p:sp>
+        <p:nvSpPr>
+          <p:cNvPr id="6" name="CaixaDeTexto 5"/>
+          <p:cNvSpPr txBox="1"/>
+          <p:nvPr/>
+        </p:nvSpPr>
+        <p:spPr>
+          <a:xfrm>
+            <a:off x="4661209" y="319813"/>
+            <a:ext cx="2844177" cy="369332"/>
+          </a:xfrm>
+          <a:prstGeom prst="rect">
+            <a:avLst/>
+          </a:prstGeom>
+          <a:noFill/>
+        </p:spPr>
+        <p:txBody>
+          <a:bodyPr wrap="none" rtlCol="0">
+            <a:spAutoFit/>
+          </a:bodyPr>
+          <a:lstStyle/>
+          <a:p>
+            <a:r>
+              <a:rPr lang="pt-BR" dirty="0" smtClean="0"/>
+              <a:t>Estou apto a receber valores</a:t>
+            </a:r>
+            <a:endParaRPr lang="pt-BR" dirty="0"/>
+          </a:p>
+        </p:txBody>
+      </p:sp>
+      <p:cxnSp>
+        <p:nvCxnSpPr>
+          <p:cNvPr id="8" name="Conector de seta reta 7"/>
+          <p:cNvCxnSpPr>
+            <a:stCxn id="6" idx="1"/>
+          </p:cNvCxnSpPr>
+          <p:nvPr/>
+        </p:nvCxnSpPr>
+        <p:spPr>
+          <a:xfrm flipH="1">
+            <a:off x="3051143" y="504479"/>
+            <a:ext cx="1610066" cy="158347"/>
+          </a:xfrm>
+          <a:prstGeom prst="straightConnector1">
+            <a:avLst/>
+          </a:prstGeom>
+          <a:ln>
+            <a:solidFill>
+              <a:srgbClr val="FF0000"/>
+            </a:solidFill>
+            <a:tailEnd type="triangle"/>
+          </a:ln>
+        </p:spPr>
+        <p:style>
+          <a:lnRef idx="1">
+            <a:schemeClr val="accent1"/>
+          </a:lnRef>
+          <a:fillRef idx="0">
+            <a:schemeClr val="accent1"/>
+          </a:fillRef>
+          <a:effectRef idx="0">
+            <a:schemeClr val="accent1"/>
+          </a:effectRef>
+          <a:fontRef idx="minor">
+            <a:schemeClr val="tx1"/>
+          </a:fontRef>
+        </p:style>
+      </p:cxnSp>
+      <p:sp>
+        <p:nvSpPr>
+          <p:cNvPr id="9" name="CaixaDeTexto 8"/>
+          <p:cNvSpPr txBox="1"/>
+          <p:nvPr/>
+        </p:nvSpPr>
+        <p:spPr>
+          <a:xfrm>
+            <a:off x="144967" y="1330557"/>
+            <a:ext cx="3364126" cy="369332"/>
+          </a:xfrm>
+          <a:prstGeom prst="rect">
+            <a:avLst/>
+          </a:prstGeom>
+          <a:solidFill>
+            <a:srgbClr val="FFFF00"/>
+          </a:solidFill>
+        </p:spPr>
+        <p:txBody>
+          <a:bodyPr wrap="none" rtlCol="0">
+            <a:spAutoFit/>
+          </a:bodyPr>
+          <a:lstStyle/>
+          <a:p>
+            <a:r>
+              <a:rPr lang="pt-BR" dirty="0" smtClean="0"/>
+              <a:t>Compartilhando itens pelo celular</a:t>
+            </a:r>
+            <a:endParaRPr lang="pt-BR" dirty="0"/>
+          </a:p>
+        </p:txBody>
+      </p:sp>
+      <p:pic>
+        <p:nvPicPr>
+          <p:cNvPr id="10" name="Imagem 9"/>
+          <p:cNvPicPr>
+            <a:picLocks noChangeAspect="1"/>
+          </p:cNvPicPr>
+          <p:nvPr/>
+        </p:nvPicPr>
+        <p:blipFill>
+          <a:blip r:embed="rId2"/>
+          <a:stretch>
+            <a:fillRect/>
+          </a:stretch>
+        </p:blipFill>
+        <p:spPr>
+          <a:xfrm>
+            <a:off x="144967" y="1870272"/>
+            <a:ext cx="4762500" cy="2400300"/>
+          </a:xfrm>
+          <a:prstGeom prst="rect">
+            <a:avLst/>
+          </a:prstGeom>
+        </p:spPr>
+      </p:pic>
+      <p:sp>
+        <p:nvSpPr>
+          <p:cNvPr id="11" name="CaixaDeTexto 10"/>
+          <p:cNvSpPr txBox="1"/>
+          <p:nvPr/>
+        </p:nvSpPr>
+        <p:spPr>
+          <a:xfrm>
+            <a:off x="6824546" y="1330557"/>
+            <a:ext cx="4706673" cy="369332"/>
+          </a:xfrm>
+          <a:prstGeom prst="rect">
+            <a:avLst/>
+          </a:prstGeom>
+          <a:noFill/>
+        </p:spPr>
+        <p:txBody>
+          <a:bodyPr wrap="none" rtlCol="0">
+            <a:spAutoFit/>
+          </a:bodyPr>
+          <a:lstStyle/>
+          <a:p>
+            <a:r>
+              <a:rPr lang="pt-BR" dirty="0" smtClean="0"/>
+              <a:t>Balão que aparece na tela como </a:t>
+            </a:r>
+            <a:r>
+              <a:rPr lang="pt-BR" dirty="0" err="1" smtClean="0"/>
+              <a:t>poup</a:t>
+            </a:r>
+            <a:r>
+              <a:rPr lang="pt-BR" dirty="0" smtClean="0"/>
+              <a:t> </a:t>
+            </a:r>
+            <a:r>
+              <a:rPr lang="pt-BR" dirty="0" err="1" smtClean="0"/>
+              <a:t>up</a:t>
+            </a:r>
+            <a:r>
+              <a:rPr lang="pt-BR" dirty="0" smtClean="0"/>
+              <a:t> (</a:t>
+            </a:r>
+            <a:r>
+              <a:rPr lang="pt-BR" dirty="0" err="1" smtClean="0"/>
+              <a:t>Toast</a:t>
+            </a:r>
+            <a:r>
+              <a:rPr lang="pt-BR" dirty="0" smtClean="0"/>
+              <a:t>)</a:t>
+            </a:r>
+            <a:endParaRPr lang="pt-BR" dirty="0"/>
+          </a:p>
+        </p:txBody>
+      </p:sp>
+      <p:sp>
+        <p:nvSpPr>
+          <p:cNvPr id="12" name="Rectangle 2"/>
+          <p:cNvSpPr>
+            <a:spLocks noChangeArrowheads="1"/>
+          </p:cNvSpPr>
+          <p:nvPr/>
+        </p:nvSpPr>
+        <p:spPr bwMode="auto">
+          <a:xfrm>
+            <a:off x="5849120" y="1870272"/>
+            <a:ext cx="6108703" cy="261610"/>
+          </a:xfrm>
+          <a:prstGeom prst="rect">
+            <a:avLst/>
+          </a:prstGeom>
+          <a:solidFill>
+            <a:srgbClr val="2B2B2B"/>
+          </a:solidFill>
+          <a:ln>
+            <a:noFill/>
+          </a:ln>
+          <a:effectLst/>
+          <a:extLst>
+            <a:ext uri="{91240B29-F687-4F45-9708-019B960494DF}">
+              <a14:hiddenLine xmlns:a14="http://schemas.microsoft.com/office/drawing/2010/main" w="9525">
+                <a:solidFill>
+                  <a:schemeClr val="tx1"/>
+                </a:solidFill>
+                <a:miter lim="800000"/>
+                <a:headEnd/>
+                <a:tailEnd/>
+              </a14:hiddenLine>
+            </a:ext>
+            <a:ext uri="{AF507438-7753-43E0-B8FC-AC1667EBCBE1}">
+              <a14:hiddenEffects xmlns:a14="http://schemas.microsoft.com/office/drawing/2010/main">
+                <a:effectLst>
+                  <a:outerShdw dist="35921" dir="2700000" algn="ctr" rotWithShape="0">
+                    <a:schemeClr val="bg2"/>
+                  </a:outerShdw>
+                </a:effectLst>
+              </a14:hiddenEffects>
+            </a:ext>
+          </a:extLst>
+        </p:spPr>
+        <p:txBody>
+          <a:bodyPr vert="horz" wrap="square" lIns="91440" tIns="45720" rIns="91440" bIns="45720" numCol="1" anchor="ctr" anchorCtr="0" compatLnSpc="1">
+            <a:prstTxWarp prst="textNoShape">
+              <a:avLst/>
+            </a:prstTxWarp>
+            <a:spAutoFit/>
+          </a:bodyPr>
+          <a:lstStyle/>
+          <a:p>
+            <a:pPr marL="0" marR="0" lvl="0" indent="0" algn="l" defTabSz="914400" rtl="0" eaLnBrk="0" fontAlgn="base" latinLnBrk="0" hangingPunct="0">
+              <a:lnSpc>
+                <a:spcPct val="100000"/>
+              </a:lnSpc>
+              <a:spcBef>
+                <a:spcPct val="0"/>
+              </a:spcBef>
+              <a:spcAft>
+                <a:spcPct val="0"/>
+              </a:spcAft>
+              <a:buClrTx/>
+              <a:buSzTx/>
+              <a:buFontTx/>
+              <a:buNone/>
+              <a:tabLst/>
+            </a:pPr>
+            <a:r>
+              <a:rPr kumimoji="0" lang="pt-BR" altLang="pt-BR" sz="1100" b="0" i="0" u="none" strike="noStrike" cap="none" normalizeH="0" baseline="0" dirty="0" err="1" smtClean="0">
+                <a:ln>
+                  <a:noFill/>
+                </a:ln>
+                <a:solidFill>
+                  <a:srgbClr val="A9B7C6"/>
+                </a:solidFill>
+                <a:effectLst/>
+                <a:latin typeface="JetBrains Mono"/>
+              </a:rPr>
+              <a:t>Toast.makeText</a:t>
+            </a:r>
+            <a:r>
+              <a:rPr kumimoji="0" lang="pt-BR" altLang="pt-BR" sz="1100" b="0" i="0" u="none" strike="noStrike" cap="none" normalizeH="0" baseline="0" dirty="0" smtClean="0">
+                <a:ln>
+                  <a:noFill/>
+                </a:ln>
+                <a:solidFill>
+                  <a:srgbClr val="A9B7C6"/>
+                </a:solidFill>
+                <a:effectLst/>
+                <a:latin typeface="JetBrains Mono"/>
+              </a:rPr>
+              <a:t>(</a:t>
+            </a:r>
+            <a:r>
+              <a:rPr kumimoji="0" lang="pt-BR" altLang="pt-BR" sz="1100" b="0" i="0" u="none" strike="noStrike" cap="none" normalizeH="0" baseline="0" dirty="0" err="1" smtClean="0">
+                <a:ln>
+                  <a:noFill/>
+                </a:ln>
+                <a:solidFill>
+                  <a:srgbClr val="CC7832"/>
+                </a:solidFill>
+                <a:effectLst/>
+                <a:latin typeface="JetBrains Mono"/>
+              </a:rPr>
+              <a:t>this</a:t>
+            </a:r>
+            <a:r>
+              <a:rPr kumimoji="0" lang="pt-BR" altLang="pt-BR" sz="1100" b="0" i="0" u="none" strike="noStrike" cap="none" normalizeH="0" baseline="0" dirty="0" smtClean="0">
+                <a:ln>
+                  <a:noFill/>
+                </a:ln>
+                <a:solidFill>
+                  <a:srgbClr val="CC7832"/>
+                </a:solidFill>
+                <a:effectLst/>
+                <a:latin typeface="JetBrains Mono"/>
+              </a:rPr>
+              <a:t>, </a:t>
+            </a:r>
+            <a:r>
+              <a:rPr kumimoji="0" lang="pt-BR" altLang="pt-BR" sz="1100" b="0" i="0" u="none" strike="noStrike" cap="none" normalizeH="0" baseline="0" dirty="0" smtClean="0">
+                <a:ln>
+                  <a:noFill/>
+                </a:ln>
+                <a:solidFill>
+                  <a:srgbClr val="6A8759"/>
+                </a:solidFill>
+                <a:effectLst/>
+                <a:latin typeface="JetBrains Mono"/>
+              </a:rPr>
+              <a:t>"Você não tem o </a:t>
+            </a:r>
+            <a:r>
+              <a:rPr kumimoji="0" lang="pt-BR" altLang="pt-BR" sz="1100" b="0" i="0" u="none" strike="noStrike" cap="none" normalizeH="0" baseline="0" dirty="0" err="1" smtClean="0">
+                <a:ln>
+                  <a:noFill/>
+                </a:ln>
+                <a:solidFill>
+                  <a:srgbClr val="6A8759"/>
+                </a:solidFill>
+                <a:effectLst/>
+                <a:latin typeface="JetBrains Mono"/>
+              </a:rPr>
+              <a:t>WhatsApp</a:t>
+            </a:r>
+            <a:r>
+              <a:rPr kumimoji="0" lang="pt-BR" altLang="pt-BR" sz="1100" b="0" i="0" u="none" strike="noStrike" cap="none" normalizeH="0" baseline="0" dirty="0" smtClean="0">
+                <a:ln>
+                  <a:noFill/>
+                </a:ln>
+                <a:solidFill>
+                  <a:srgbClr val="6A8759"/>
+                </a:solidFill>
+                <a:effectLst/>
+                <a:latin typeface="JetBrains Mono"/>
+              </a:rPr>
+              <a:t> instalado"</a:t>
+            </a:r>
+            <a:r>
+              <a:rPr kumimoji="0" lang="pt-BR" altLang="pt-BR" sz="1100" b="0" i="0" u="none" strike="noStrike" cap="none" normalizeH="0" baseline="0" dirty="0" smtClean="0">
+                <a:ln>
+                  <a:noFill/>
+                </a:ln>
+                <a:solidFill>
+                  <a:srgbClr val="CC7832"/>
+                </a:solidFill>
+                <a:effectLst/>
+                <a:latin typeface="JetBrains Mono"/>
+              </a:rPr>
+              <a:t>, </a:t>
+            </a:r>
+            <a:r>
+              <a:rPr kumimoji="0" lang="pt-BR" altLang="pt-BR" sz="1100" b="0" i="0" u="none" strike="noStrike" cap="none" normalizeH="0" baseline="0" dirty="0" err="1" smtClean="0">
+                <a:ln>
+                  <a:noFill/>
+                </a:ln>
+                <a:solidFill>
+                  <a:srgbClr val="A9B7C6"/>
+                </a:solidFill>
+                <a:effectLst/>
+                <a:latin typeface="JetBrains Mono"/>
+              </a:rPr>
+              <a:t>Toast.</a:t>
+            </a:r>
+            <a:r>
+              <a:rPr kumimoji="0" lang="pt-BR" altLang="pt-BR" sz="1100" b="0" i="1" u="none" strike="noStrike" cap="none" normalizeH="0" baseline="0" dirty="0" err="1" smtClean="0">
+                <a:ln>
+                  <a:noFill/>
+                </a:ln>
+                <a:solidFill>
+                  <a:srgbClr val="9876AA"/>
+                </a:solidFill>
+                <a:effectLst/>
+                <a:latin typeface="JetBrains Mono"/>
+              </a:rPr>
+              <a:t>LENGTH_SHORT</a:t>
+            </a:r>
+            <a:r>
+              <a:rPr kumimoji="0" lang="pt-BR" altLang="pt-BR" sz="1100" b="0" i="0" u="none" strike="noStrike" cap="none" normalizeH="0" baseline="0" dirty="0" smtClean="0">
+                <a:ln>
+                  <a:noFill/>
+                </a:ln>
+                <a:solidFill>
+                  <a:srgbClr val="A9B7C6"/>
+                </a:solidFill>
+                <a:effectLst/>
+                <a:latin typeface="JetBrains Mono"/>
+              </a:rPr>
+              <a:t>).show()</a:t>
+            </a:r>
+            <a:endParaRPr kumimoji="0" lang="pt-BR" altLang="pt-BR" sz="2400" b="0" i="0" u="none" strike="noStrike" cap="none" normalizeH="0" baseline="0" dirty="0" smtClean="0">
+              <a:ln>
+                <a:noFill/>
+              </a:ln>
+              <a:solidFill>
+                <a:schemeClr val="tx1"/>
+              </a:solidFill>
+              <a:effectLst/>
+              <a:latin typeface="Arial" panose="020B0604020202020204" pitchFamily="34" charset="0"/>
+            </a:endParaRPr>
+          </a:p>
+        </p:txBody>
+      </p:sp>
+    </p:spTree>
+    <p:extLst>
+      <p:ext uri="{BB962C8B-B14F-4D97-AF65-F5344CB8AC3E}">
+        <p14:creationId xmlns:p14="http://schemas.microsoft.com/office/powerpoint/2010/main" val="1838757883"/>
+      </p:ext>
+    </p:extLst>
+  </p:cSld>
+  <p:clrMapOvr>
+    <a:masterClrMapping/>
+  </p:clrMapOvr>
+</p:sld>
+</file>
+
+<file path=ppt/slides/slide6.xml><?xml version="1.0" encoding="utf-8"?>
+<p:sld xmlns:a="http://schemas.openxmlformats.org/drawingml/2006/main" xmlns:r="http://schemas.openxmlformats.org/officeDocument/2006/relationships" xmlns:p="http://schemas.openxmlformats.org/presentationml/2006/main">
+  <p:cSld>
+    <p:spTree>
+      <p:nvGrpSpPr>
+        <p:cNvPr id="1" name=""/>
+        <p:cNvGrpSpPr/>
+        <p:nvPr/>
+      </p:nvGrpSpPr>
+      <p:grpSpPr>
+        <a:xfrm>
+          <a:off x="0" y="0"/>
+          <a:ext cx="0" cy="0"/>
+          <a:chOff x="0" y="0"/>
+          <a:chExt cx="0" cy="0"/>
+        </a:xfrm>
+      </p:grpSpPr>
+      <p:sp>
+        <p:nvSpPr>
+          <p:cNvPr id="2" name="CaixaDeTexto 1"/>
+          <p:cNvSpPr txBox="1"/>
+          <p:nvPr/>
+        </p:nvSpPr>
+        <p:spPr>
+          <a:xfrm>
+            <a:off x="0" y="0"/>
+            <a:ext cx="2481449" cy="369332"/>
+          </a:xfrm>
+          <a:prstGeom prst="rect">
+            <a:avLst/>
+          </a:prstGeom>
+          <a:noFill/>
+        </p:spPr>
+        <p:txBody>
+          <a:bodyPr wrap="none" rtlCol="0">
+            <a:spAutoFit/>
+          </a:bodyPr>
+          <a:lstStyle/>
+          <a:p>
+            <a:r>
+              <a:rPr lang="pt-BR" dirty="0" smtClean="0"/>
+              <a:t>Animação Dados no </a:t>
+            </a:r>
+            <a:r>
+              <a:rPr lang="pt-BR" dirty="0" err="1" smtClean="0"/>
+              <a:t>App</a:t>
+            </a:r>
+            <a:endParaRPr lang="pt-BR" dirty="0"/>
+          </a:p>
+        </p:txBody>
+      </p:sp>
+      <p:pic>
+        <p:nvPicPr>
+          <p:cNvPr id="3" name="Imagem 2"/>
+          <p:cNvPicPr>
+            <a:picLocks noChangeAspect="1"/>
+          </p:cNvPicPr>
+          <p:nvPr/>
+        </p:nvPicPr>
+        <p:blipFill>
+          <a:blip r:embed="rId2"/>
+          <a:stretch>
+            <a:fillRect/>
+          </a:stretch>
+        </p:blipFill>
+        <p:spPr>
+          <a:xfrm>
+            <a:off x="115926" y="1329783"/>
+            <a:ext cx="5581650" cy="2971800"/>
+          </a:xfrm>
+          <a:prstGeom prst="rect">
+            <a:avLst/>
+          </a:prstGeom>
+        </p:spPr>
+      </p:pic>
+      <p:pic>
+        <p:nvPicPr>
+          <p:cNvPr id="4" name="Imagem 3"/>
+          <p:cNvPicPr>
+            <a:picLocks noChangeAspect="1"/>
+          </p:cNvPicPr>
+          <p:nvPr/>
+        </p:nvPicPr>
+        <p:blipFill>
+          <a:blip r:embed="rId3"/>
+          <a:stretch>
+            <a:fillRect/>
+          </a:stretch>
+        </p:blipFill>
+        <p:spPr>
+          <a:xfrm>
+            <a:off x="115926" y="369332"/>
+            <a:ext cx="3467100" cy="819150"/>
+          </a:xfrm>
+          <a:prstGeom prst="rect">
+            <a:avLst/>
+          </a:prstGeom>
+        </p:spPr>
+      </p:pic>
+      <p:sp>
+        <p:nvSpPr>
+          <p:cNvPr id="5" name="CaixaDeTexto 4"/>
+          <p:cNvSpPr txBox="1"/>
+          <p:nvPr/>
+        </p:nvSpPr>
+        <p:spPr>
+          <a:xfrm rot="20143487">
+            <a:off x="3178564" y="1191283"/>
+            <a:ext cx="1339982" cy="276999"/>
+          </a:xfrm>
+          <a:prstGeom prst="rect">
+            <a:avLst/>
+          </a:prstGeom>
+          <a:noFill/>
+        </p:spPr>
+        <p:txBody>
+          <a:bodyPr wrap="none" rtlCol="0">
+            <a:spAutoFit/>
+          </a:bodyPr>
+          <a:lstStyle/>
+          <a:p>
+            <a:r>
+              <a:rPr lang="pt-BR" sz="1200" dirty="0" smtClean="0">
+                <a:solidFill>
+                  <a:srgbClr val="FF0000"/>
+                </a:solidFill>
+              </a:rPr>
+              <a:t>Tempo de duração</a:t>
+            </a:r>
+            <a:endParaRPr lang="pt-BR" sz="1200" dirty="0">
+              <a:solidFill>
+                <a:srgbClr val="FF0000"/>
+              </a:solidFill>
+            </a:endParaRPr>
+          </a:p>
+        </p:txBody>
+      </p:sp>
+      <p:sp>
+        <p:nvSpPr>
+          <p:cNvPr id="6" name="CaixaDeTexto 5"/>
+          <p:cNvSpPr txBox="1"/>
+          <p:nvPr/>
+        </p:nvSpPr>
+        <p:spPr>
+          <a:xfrm rot="20143487">
+            <a:off x="4616221" y="807003"/>
+            <a:ext cx="2394566" cy="276999"/>
+          </a:xfrm>
+          <a:prstGeom prst="rect">
+            <a:avLst/>
+          </a:prstGeom>
+          <a:noFill/>
+        </p:spPr>
+        <p:txBody>
+          <a:bodyPr wrap="none" rtlCol="0">
+            <a:spAutoFit/>
+          </a:bodyPr>
+          <a:lstStyle/>
+          <a:p>
+            <a:r>
+              <a:rPr lang="pt-BR" sz="1200" dirty="0" smtClean="0">
+                <a:solidFill>
+                  <a:srgbClr val="FF0000"/>
+                </a:solidFill>
+              </a:rPr>
+              <a:t>Tempo de ciclos para executar ação</a:t>
+            </a:r>
+            <a:endParaRPr lang="pt-BR" sz="1200" dirty="0">
+              <a:solidFill>
+                <a:srgbClr val="FF0000"/>
+              </a:solidFill>
+            </a:endParaRPr>
+          </a:p>
+        </p:txBody>
+      </p:sp>
+      <p:sp>
+        <p:nvSpPr>
+          <p:cNvPr id="7" name="CaixaDeTexto 6"/>
+          <p:cNvSpPr txBox="1"/>
+          <p:nvPr/>
+        </p:nvSpPr>
+        <p:spPr>
+          <a:xfrm>
+            <a:off x="1811458" y="1914245"/>
+            <a:ext cx="1797672" cy="276999"/>
+          </a:xfrm>
+          <a:prstGeom prst="rect">
+            <a:avLst/>
+          </a:prstGeom>
+          <a:noFill/>
+        </p:spPr>
+        <p:txBody>
+          <a:bodyPr wrap="none" rtlCol="0">
+            <a:spAutoFit/>
+          </a:bodyPr>
+          <a:lstStyle/>
+          <a:p>
+            <a:r>
+              <a:rPr lang="pt-BR" sz="1200" dirty="0" smtClean="0">
+                <a:solidFill>
+                  <a:srgbClr val="FF0000"/>
+                </a:solidFill>
+              </a:rPr>
+              <a:t>Chamada de outra função</a:t>
+            </a:r>
+            <a:endParaRPr lang="pt-BR" sz="1200" dirty="0">
+              <a:solidFill>
+                <a:srgbClr val="FF0000"/>
+              </a:solidFill>
+            </a:endParaRPr>
+          </a:p>
+        </p:txBody>
+      </p:sp>
+      <p:sp>
+        <p:nvSpPr>
+          <p:cNvPr id="8" name="CaixaDeTexto 7"/>
+          <p:cNvSpPr txBox="1"/>
+          <p:nvPr/>
+        </p:nvSpPr>
+        <p:spPr>
+          <a:xfrm>
+            <a:off x="2684190" y="2498707"/>
+            <a:ext cx="1493679" cy="276999"/>
+          </a:xfrm>
+          <a:prstGeom prst="rect">
+            <a:avLst/>
+          </a:prstGeom>
+          <a:noFill/>
+        </p:spPr>
+        <p:txBody>
+          <a:bodyPr wrap="none" rtlCol="0">
+            <a:spAutoFit/>
+          </a:bodyPr>
+          <a:lstStyle/>
+          <a:p>
+            <a:r>
+              <a:rPr lang="pt-BR" sz="1200" dirty="0" smtClean="0">
+                <a:solidFill>
+                  <a:srgbClr val="FF0000"/>
+                </a:solidFill>
+              </a:rPr>
+              <a:t>Função após finalizar</a:t>
+            </a:r>
+            <a:endParaRPr lang="pt-BR" sz="1200" dirty="0">
+              <a:solidFill>
+                <a:srgbClr val="FF0000"/>
+              </a:solidFill>
+            </a:endParaRPr>
+          </a:p>
+        </p:txBody>
+      </p:sp>
+      <p:cxnSp>
+        <p:nvCxnSpPr>
+          <p:cNvPr id="10" name="Conector reto 9"/>
+          <p:cNvCxnSpPr/>
+          <p:nvPr/>
+        </p:nvCxnSpPr>
+        <p:spPr>
+          <a:xfrm flipH="1">
+            <a:off x="7092176" y="184666"/>
+            <a:ext cx="1" cy="6383402"/>
+          </a:xfrm>
+          <a:prstGeom prst="line">
+            <a:avLst/>
+          </a:prstGeom>
+          <a:ln>
+            <a:solidFill>
+              <a:schemeClr val="tx1"/>
+            </a:solidFill>
+          </a:ln>
+        </p:spPr>
+        <p:style>
+          <a:lnRef idx="1">
+            <a:schemeClr val="accent1"/>
+          </a:lnRef>
+          <a:fillRef idx="0">
+            <a:schemeClr val="accent1"/>
+          </a:fillRef>
+          <a:effectRef idx="0">
+            <a:schemeClr val="accent1"/>
+          </a:effectRef>
+          <a:fontRef idx="minor">
+            <a:schemeClr val="tx1"/>
+          </a:fontRef>
+        </p:style>
+      </p:cxnSp>
+      <p:pic>
+        <p:nvPicPr>
+          <p:cNvPr id="11" name="Imagem 10"/>
+          <p:cNvPicPr>
+            <a:picLocks noChangeAspect="1"/>
+          </p:cNvPicPr>
+          <p:nvPr/>
+        </p:nvPicPr>
+        <p:blipFill>
+          <a:blip r:embed="rId4"/>
+          <a:stretch>
+            <a:fillRect/>
+          </a:stretch>
+        </p:blipFill>
+        <p:spPr>
+          <a:xfrm>
+            <a:off x="115926" y="4703284"/>
+            <a:ext cx="2027513" cy="716621"/>
+          </a:xfrm>
+          <a:prstGeom prst="rect">
+            <a:avLst/>
+          </a:prstGeom>
+        </p:spPr>
+      </p:pic>
+      <p:pic>
+        <p:nvPicPr>
+          <p:cNvPr id="12" name="Imagem 11"/>
+          <p:cNvPicPr>
+            <a:picLocks noChangeAspect="1"/>
+          </p:cNvPicPr>
+          <p:nvPr/>
+        </p:nvPicPr>
+        <p:blipFill>
+          <a:blip r:embed="rId5"/>
+          <a:stretch>
+            <a:fillRect/>
+          </a:stretch>
+        </p:blipFill>
+        <p:spPr>
+          <a:xfrm>
+            <a:off x="2481449" y="4703284"/>
+            <a:ext cx="3923335" cy="1719818"/>
+          </a:xfrm>
+          <a:prstGeom prst="rect">
+            <a:avLst/>
+          </a:prstGeom>
+        </p:spPr>
+      </p:pic>
+      <p:pic>
+        <p:nvPicPr>
+          <p:cNvPr id="13" name="Imagem 12"/>
+          <p:cNvPicPr>
+            <a:picLocks noChangeAspect="1"/>
+          </p:cNvPicPr>
+          <p:nvPr/>
+        </p:nvPicPr>
+        <p:blipFill>
+          <a:blip r:embed="rId6"/>
+          <a:stretch>
+            <a:fillRect/>
+          </a:stretch>
+        </p:blipFill>
+        <p:spPr>
+          <a:xfrm>
+            <a:off x="7415801" y="449649"/>
+            <a:ext cx="4638675" cy="238125"/>
+          </a:xfrm>
+          <a:prstGeom prst="rect">
+            <a:avLst/>
+          </a:prstGeom>
+        </p:spPr>
+      </p:pic>
+      <p:sp>
+        <p:nvSpPr>
+          <p:cNvPr id="14" name="CaixaDeTexto 13"/>
+          <p:cNvSpPr txBox="1"/>
+          <p:nvPr/>
+        </p:nvSpPr>
+        <p:spPr>
+          <a:xfrm>
+            <a:off x="0" y="4343735"/>
+            <a:ext cx="1756891" cy="369332"/>
+          </a:xfrm>
+          <a:prstGeom prst="rect">
+            <a:avLst/>
+          </a:prstGeom>
+          <a:noFill/>
+        </p:spPr>
+        <p:txBody>
+          <a:bodyPr wrap="none" rtlCol="0">
+            <a:spAutoFit/>
+          </a:bodyPr>
+          <a:lstStyle/>
+          <a:p>
+            <a:r>
+              <a:rPr lang="pt-BR" dirty="0" smtClean="0"/>
+              <a:t>Criar a animação</a:t>
+            </a:r>
+            <a:endParaRPr lang="pt-BR" dirty="0"/>
+          </a:p>
+        </p:txBody>
+      </p:sp>
+      <p:cxnSp>
+        <p:nvCxnSpPr>
+          <p:cNvPr id="16" name="Conector de seta reta 15"/>
+          <p:cNvCxnSpPr>
+            <a:stCxn id="11" idx="3"/>
+          </p:cNvCxnSpPr>
+          <p:nvPr/>
+        </p:nvCxnSpPr>
+        <p:spPr>
+          <a:xfrm flipV="1">
+            <a:off x="2143439" y="5061594"/>
+            <a:ext cx="291824" cy="1"/>
+          </a:xfrm>
+          <a:prstGeom prst="straightConnector1">
+            <a:avLst/>
+          </a:prstGeom>
+          <a:ln>
+            <a:solidFill>
+              <a:srgbClr val="FF0000"/>
+            </a:solidFill>
+            <a:tailEnd type="triangle"/>
+          </a:ln>
+        </p:spPr>
+        <p:style>
+          <a:lnRef idx="1">
+            <a:schemeClr val="accent1"/>
+          </a:lnRef>
+          <a:fillRef idx="0">
+            <a:schemeClr val="accent1"/>
+          </a:fillRef>
+          <a:effectRef idx="0">
+            <a:schemeClr val="accent1"/>
+          </a:effectRef>
+          <a:fontRef idx="minor">
+            <a:schemeClr val="tx1"/>
+          </a:fontRef>
+        </p:style>
+      </p:cxnSp>
+      <p:sp>
+        <p:nvSpPr>
+          <p:cNvPr id="17" name="CaixaDeTexto 16"/>
+          <p:cNvSpPr txBox="1"/>
+          <p:nvPr/>
+        </p:nvSpPr>
+        <p:spPr>
+          <a:xfrm>
+            <a:off x="7299875" y="118183"/>
+            <a:ext cx="3056927" cy="369332"/>
+          </a:xfrm>
+          <a:prstGeom prst="rect">
+            <a:avLst/>
+          </a:prstGeom>
+          <a:noFill/>
+        </p:spPr>
+        <p:txBody>
+          <a:bodyPr wrap="none" rtlCol="0">
+            <a:spAutoFit/>
+          </a:bodyPr>
+          <a:lstStyle/>
+          <a:p>
+            <a:r>
+              <a:rPr lang="pt-BR" dirty="0" smtClean="0"/>
+              <a:t>Na </a:t>
+            </a:r>
+            <a:r>
+              <a:rPr lang="pt-BR" dirty="0" err="1" smtClean="0"/>
+              <a:t>activity</a:t>
+            </a:r>
+            <a:r>
+              <a:rPr lang="pt-BR" dirty="0" smtClean="0"/>
+              <a:t> chamar a animação</a:t>
+            </a:r>
+          </a:p>
+        </p:txBody>
+      </p:sp>
+      <p:pic>
+        <p:nvPicPr>
+          <p:cNvPr id="18" name="Imagem 17"/>
+          <p:cNvPicPr>
+            <a:picLocks noChangeAspect="1"/>
+          </p:cNvPicPr>
+          <p:nvPr/>
+        </p:nvPicPr>
+        <p:blipFill>
+          <a:blip r:embed="rId7"/>
+          <a:stretch>
+            <a:fillRect/>
+          </a:stretch>
+        </p:blipFill>
+        <p:spPr>
+          <a:xfrm>
+            <a:off x="7415801" y="818981"/>
+            <a:ext cx="1828800" cy="257175"/>
+          </a:xfrm>
+          <a:prstGeom prst="rect">
+            <a:avLst/>
+          </a:prstGeom>
+        </p:spPr>
+      </p:pic>
+      <p:sp>
+        <p:nvSpPr>
+          <p:cNvPr id="19" name="CaixaDeTexto 18"/>
+          <p:cNvSpPr txBox="1"/>
+          <p:nvPr/>
+        </p:nvSpPr>
+        <p:spPr>
+          <a:xfrm>
+            <a:off x="9270821" y="760836"/>
+            <a:ext cx="2509470" cy="369332"/>
+          </a:xfrm>
+          <a:prstGeom prst="rect">
+            <a:avLst/>
+          </a:prstGeom>
+          <a:noFill/>
+        </p:spPr>
+        <p:txBody>
+          <a:bodyPr wrap="none" rtlCol="0">
+            <a:spAutoFit/>
+          </a:bodyPr>
+          <a:lstStyle/>
+          <a:p>
+            <a:r>
+              <a:rPr lang="pt-BR" dirty="0" smtClean="0"/>
+              <a:t>Quantas vezes irá repetir</a:t>
+            </a:r>
+            <a:endParaRPr lang="pt-BR" dirty="0"/>
+          </a:p>
+        </p:txBody>
+      </p:sp>
+      <p:cxnSp>
+        <p:nvCxnSpPr>
+          <p:cNvPr id="21" name="Conector de seta reta 20"/>
+          <p:cNvCxnSpPr/>
+          <p:nvPr/>
+        </p:nvCxnSpPr>
+        <p:spPr>
+          <a:xfrm flipH="1">
+            <a:off x="2710294" y="687774"/>
+            <a:ext cx="4589581" cy="2936372"/>
+          </a:xfrm>
+          <a:prstGeom prst="straightConnector1">
+            <a:avLst/>
+          </a:prstGeom>
+          <a:ln>
+            <a:solidFill>
+              <a:srgbClr val="FF0000"/>
+            </a:solidFill>
+            <a:tailEnd type="triangle"/>
+          </a:ln>
+        </p:spPr>
+        <p:style>
+          <a:lnRef idx="1">
+            <a:schemeClr val="accent1"/>
+          </a:lnRef>
+          <a:fillRef idx="0">
+            <a:schemeClr val="accent1"/>
+          </a:fillRef>
+          <a:effectRef idx="0">
+            <a:schemeClr val="accent1"/>
+          </a:effectRef>
+          <a:fontRef idx="minor">
+            <a:schemeClr val="tx1"/>
+          </a:fontRef>
+        </p:style>
+      </p:cxnSp>
+    </p:spTree>
+    <p:extLst>
+      <p:ext uri="{BB962C8B-B14F-4D97-AF65-F5344CB8AC3E}">
+        <p14:creationId xmlns:p14="http://schemas.microsoft.com/office/powerpoint/2010/main" val="3279124158"/>
+      </p:ext>
+    </p:extLst>
+  </p:cSld>
+  <p:clrMapOvr>
+    <a:masterClrMapping/>
+  </p:clrMapOvr>
+</p:sld>
+</file>
+
+<file path=ppt/slides/slide7.xml><?xml version="1.0" encoding="utf-8"?>
+<p:sld xmlns:a="http://schemas.openxmlformats.org/drawingml/2006/main" xmlns:r="http://schemas.openxmlformats.org/officeDocument/2006/relationships" xmlns:p="http://schemas.openxmlformats.org/presentationml/2006/main">
+  <p:cSld>
+    <p:spTree>
+      <p:nvGrpSpPr>
+        <p:cNvPr id="1" name=""/>
+        <p:cNvGrpSpPr/>
+        <p:nvPr/>
+      </p:nvGrpSpPr>
+      <p:grpSpPr>
+        <a:xfrm>
+          <a:off x="0" y="0"/>
+          <a:ext cx="0" cy="0"/>
+          <a:chOff x="0" y="0"/>
+          <a:chExt cx="0" cy="0"/>
+        </a:xfrm>
+      </p:grpSpPr>
+    </p:spTree>
+    <p:extLst>
+      <p:ext uri="{BB962C8B-B14F-4D97-AF65-F5344CB8AC3E}">
+        <p14:creationId xmlns:p14="http://schemas.microsoft.com/office/powerpoint/2010/main" val="3670318361"/>
+      </p:ext>
+    </p:extLst>
+  </p:cSld>
+  <p:clrMapOvr>
+    <a:masterClrMapping/>
+  </p:clrMapOvr>
+</p:sld>
+</file>
+
+<file path=ppt/slides/slide8.xml><?xml version="1.0" encoding="utf-8"?>
+<p:sld xmlns:a="http://schemas.openxmlformats.org/drawingml/2006/main" xmlns:r="http://schemas.openxmlformats.org/officeDocument/2006/relationships" xmlns:p="http://schemas.openxmlformats.org/presentationml/2006/main">
+  <p:cSld>
+    <p:spTree>
+      <p:nvGrpSpPr>
+        <p:cNvPr id="1" name=""/>
+        <p:cNvGrpSpPr/>
+        <p:nvPr/>
+      </p:nvGrpSpPr>
+      <p:grpSpPr>
+        <a:xfrm>
+          <a:off x="0" y="0"/>
+          <a:ext cx="0" cy="0"/>
+          <a:chOff x="0" y="0"/>
+          <a:chExt cx="0" cy="0"/>
+        </a:xfrm>
+      </p:grpSpPr>
+    </p:spTree>
+    <p:extLst>
+      <p:ext uri="{BB962C8B-B14F-4D97-AF65-F5344CB8AC3E}">
+        <p14:creationId xmlns:p14="http://schemas.microsoft.com/office/powerpoint/2010/main" val="4249970389"/>
       </p:ext>
     </p:extLst>
   </p:cSld>

</xml_diff>